<commit_message>
update presentations and matlab code
</commit_message>
<xml_diff>
--- a/clases/Cap_00_Lineas_Generales/program/IMG00_Presentacion.pptx
+++ b/clases/Cap_00_Lineas_Generales/program/IMG00_Presentacion.pptx
@@ -693,7 +693,7 @@
           <a:lstStyle/>
           <a:p>
             <a:pPr eaLnBrk="1" hangingPunct="1"/>
-            <a:endParaRPr lang="es-ES" smtClean="0"/>
+            <a:endParaRPr lang="es-ES"/>
           </a:p>
         </p:txBody>
       </p:sp>
@@ -2936,7 +2936,7 @@
           <a:lstStyle/>
           <a:p>
             <a:r>
-              <a:rPr lang="es-ES" dirty="0" smtClean="0"/>
+              <a:rPr lang="es-ES" dirty="0"/>
               <a:t>Haga clic para modificar el estilo de título del patrón</a:t>
             </a:r>
             <a:endParaRPr lang="es-CL" dirty="0"/>
@@ -3004,7 +3004,7 @@
           </a:lstStyle>
           <a:p>
             <a:r>
-              <a:rPr lang="es-ES" dirty="0" smtClean="0"/>
+              <a:rPr lang="es-ES" dirty="0"/>
               <a:t>Haga clic para modificar el estilo de subtítulo del patrón</a:t>
             </a:r>
             <a:endParaRPr lang="es-CL" dirty="0"/>
@@ -3060,7 +3060,7 @@
           <a:lstStyle/>
           <a:p>
             <a:r>
-              <a:rPr lang="es-ES" smtClean="0"/>
+              <a:rPr lang="es-ES"/>
               <a:t>Haga clic para modificar el estilo de título del patrón</a:t>
             </a:r>
             <a:endParaRPr lang="es-CL"/>
@@ -3092,35 +3092,35 @@
           <a:p>
             <a:pPr lvl="0"/>
             <a:r>
-              <a:rPr lang="es-ES" smtClean="0"/>
+              <a:rPr lang="es-ES"/>
               <a:t>Haga clic para modificar el estilo de texto del patrón</a:t>
             </a:r>
           </a:p>
           <a:p>
             <a:pPr lvl="1"/>
             <a:r>
-              <a:rPr lang="es-ES" smtClean="0"/>
+              <a:rPr lang="es-ES"/>
               <a:t>Segundo nivel</a:t>
             </a:r>
           </a:p>
           <a:p>
             <a:pPr lvl="2"/>
             <a:r>
-              <a:rPr lang="es-ES" smtClean="0"/>
+              <a:rPr lang="es-ES"/>
               <a:t>Tercer nivel</a:t>
             </a:r>
           </a:p>
           <a:p>
             <a:pPr lvl="3"/>
             <a:r>
-              <a:rPr lang="es-ES" smtClean="0"/>
+              <a:rPr lang="es-ES"/>
               <a:t>Cuarto nivel</a:t>
             </a:r>
           </a:p>
           <a:p>
             <a:pPr lvl="4"/>
             <a:r>
-              <a:rPr lang="es-ES" smtClean="0"/>
+              <a:rPr lang="es-ES"/>
               <a:t>Quinto nivel</a:t>
             </a:r>
             <a:endParaRPr lang="es-CL"/>
@@ -3176,7 +3176,7 @@
           <a:lstStyle/>
           <a:p>
             <a:r>
-              <a:rPr lang="es-ES" smtClean="0"/>
+              <a:rPr lang="es-ES"/>
               <a:t>Haga clic para modificar el estilo de título del patrón</a:t>
             </a:r>
             <a:endParaRPr lang="es-CL"/>
@@ -3208,35 +3208,35 @@
           <a:p>
             <a:pPr lvl="0"/>
             <a:r>
-              <a:rPr lang="es-ES" smtClean="0"/>
+              <a:rPr lang="es-ES"/>
               <a:t>Haga clic para modificar el estilo de texto del patrón</a:t>
             </a:r>
           </a:p>
           <a:p>
             <a:pPr lvl="1"/>
             <a:r>
-              <a:rPr lang="es-ES" smtClean="0"/>
+              <a:rPr lang="es-ES"/>
               <a:t>Segundo nivel</a:t>
             </a:r>
           </a:p>
           <a:p>
             <a:pPr lvl="2"/>
             <a:r>
-              <a:rPr lang="es-ES" smtClean="0"/>
+              <a:rPr lang="es-ES"/>
               <a:t>Tercer nivel</a:t>
             </a:r>
           </a:p>
           <a:p>
             <a:pPr lvl="3"/>
             <a:r>
-              <a:rPr lang="es-ES" smtClean="0"/>
+              <a:rPr lang="es-ES"/>
               <a:t>Cuarto nivel</a:t>
             </a:r>
           </a:p>
           <a:p>
             <a:pPr lvl="4"/>
             <a:r>
-              <a:rPr lang="es-ES" smtClean="0"/>
+              <a:rPr lang="es-ES"/>
               <a:t>Quinto nivel</a:t>
             </a:r>
             <a:endParaRPr lang="es-CL"/>
@@ -3292,7 +3292,7 @@
           <a:lstStyle/>
           <a:p>
             <a:r>
-              <a:rPr lang="es-ES" smtClean="0"/>
+              <a:rPr lang="es-ES"/>
               <a:t>Haga clic para modificar el estilo de título del patrón</a:t>
             </a:r>
             <a:endParaRPr lang="es-CL"/>
@@ -3360,7 +3360,7 @@
           </a:lstStyle>
           <a:p>
             <a:r>
-              <a:rPr lang="es-ES" smtClean="0"/>
+              <a:rPr lang="es-ES"/>
               <a:t>Haga clic para modificar el estilo de subtítulo del patrón</a:t>
             </a:r>
             <a:endParaRPr lang="es-CL"/>
@@ -3416,7 +3416,7 @@
           <a:lstStyle/>
           <a:p>
             <a:r>
-              <a:rPr lang="es-ES" smtClean="0"/>
+              <a:rPr lang="es-ES"/>
               <a:t>Haga clic para modificar el estilo de título del patrón</a:t>
             </a:r>
             <a:endParaRPr lang="es-CL"/>
@@ -3448,35 +3448,35 @@
           <a:p>
             <a:pPr lvl="0"/>
             <a:r>
-              <a:rPr lang="es-ES" smtClean="0"/>
+              <a:rPr lang="es-ES"/>
               <a:t>Haga clic para modificar el estilo de texto del patrón</a:t>
             </a:r>
           </a:p>
           <a:p>
             <a:pPr lvl="1"/>
             <a:r>
-              <a:rPr lang="es-ES" smtClean="0"/>
+              <a:rPr lang="es-ES"/>
               <a:t>Segundo nivel</a:t>
             </a:r>
           </a:p>
           <a:p>
             <a:pPr lvl="2"/>
             <a:r>
-              <a:rPr lang="es-ES" smtClean="0"/>
+              <a:rPr lang="es-ES"/>
               <a:t>Tercer nivel</a:t>
             </a:r>
           </a:p>
           <a:p>
             <a:pPr lvl="3"/>
             <a:r>
-              <a:rPr lang="es-ES" smtClean="0"/>
+              <a:rPr lang="es-ES"/>
               <a:t>Cuarto nivel</a:t>
             </a:r>
           </a:p>
           <a:p>
             <a:pPr lvl="4"/>
             <a:r>
-              <a:rPr lang="es-ES" smtClean="0"/>
+              <a:rPr lang="es-ES"/>
               <a:t>Quinto nivel</a:t>
             </a:r>
             <a:endParaRPr lang="es-CL"/>
@@ -3536,7 +3536,7 @@
           </a:lstStyle>
           <a:p>
             <a:r>
-              <a:rPr lang="es-ES" smtClean="0"/>
+              <a:rPr lang="es-ES"/>
               <a:t>Haga clic para modificar el estilo de título del patrón</a:t>
             </a:r>
             <a:endParaRPr lang="es-CL"/>
@@ -3605,7 +3605,7 @@
           <a:p>
             <a:pPr lvl="0"/>
             <a:r>
-              <a:rPr lang="es-ES" smtClean="0"/>
+              <a:rPr lang="es-ES"/>
               <a:t>Haga clic para modificar el estilo de texto del patrón</a:t>
             </a:r>
           </a:p>
@@ -3660,7 +3660,7 @@
           <a:lstStyle/>
           <a:p>
             <a:r>
-              <a:rPr lang="es-ES" smtClean="0"/>
+              <a:rPr lang="es-ES"/>
               <a:t>Haga clic para modificar el estilo de título del patrón</a:t>
             </a:r>
             <a:endParaRPr lang="es-CL"/>
@@ -3720,35 +3720,35 @@
           <a:p>
             <a:pPr lvl="0"/>
             <a:r>
-              <a:rPr lang="es-ES" smtClean="0"/>
+              <a:rPr lang="es-ES"/>
               <a:t>Haga clic para modificar el estilo de texto del patrón</a:t>
             </a:r>
           </a:p>
           <a:p>
             <a:pPr lvl="1"/>
             <a:r>
-              <a:rPr lang="es-ES" smtClean="0"/>
+              <a:rPr lang="es-ES"/>
               <a:t>Segundo nivel</a:t>
             </a:r>
           </a:p>
           <a:p>
             <a:pPr lvl="2"/>
             <a:r>
-              <a:rPr lang="es-ES" smtClean="0"/>
+              <a:rPr lang="es-ES"/>
               <a:t>Tercer nivel</a:t>
             </a:r>
           </a:p>
           <a:p>
             <a:pPr lvl="3"/>
             <a:r>
-              <a:rPr lang="es-ES" smtClean="0"/>
+              <a:rPr lang="es-ES"/>
               <a:t>Cuarto nivel</a:t>
             </a:r>
           </a:p>
           <a:p>
             <a:pPr lvl="4"/>
             <a:r>
-              <a:rPr lang="es-ES" smtClean="0"/>
+              <a:rPr lang="es-ES"/>
               <a:t>Quinto nivel</a:t>
             </a:r>
             <a:endParaRPr lang="es-CL"/>
@@ -3808,35 +3808,35 @@
           <a:p>
             <a:pPr lvl="0"/>
             <a:r>
-              <a:rPr lang="es-ES" smtClean="0"/>
+              <a:rPr lang="es-ES"/>
               <a:t>Haga clic para modificar el estilo de texto del patrón</a:t>
             </a:r>
           </a:p>
           <a:p>
             <a:pPr lvl="1"/>
             <a:r>
-              <a:rPr lang="es-ES" smtClean="0"/>
+              <a:rPr lang="es-ES"/>
               <a:t>Segundo nivel</a:t>
             </a:r>
           </a:p>
           <a:p>
             <a:pPr lvl="2"/>
             <a:r>
-              <a:rPr lang="es-ES" smtClean="0"/>
+              <a:rPr lang="es-ES"/>
               <a:t>Tercer nivel</a:t>
             </a:r>
           </a:p>
           <a:p>
             <a:pPr lvl="3"/>
             <a:r>
-              <a:rPr lang="es-ES" smtClean="0"/>
+              <a:rPr lang="es-ES"/>
               <a:t>Cuarto nivel</a:t>
             </a:r>
           </a:p>
           <a:p>
             <a:pPr lvl="4"/>
             <a:r>
-              <a:rPr lang="es-ES" smtClean="0"/>
+              <a:rPr lang="es-ES"/>
               <a:t>Quinto nivel</a:t>
             </a:r>
             <a:endParaRPr lang="es-CL"/>
@@ -3896,7 +3896,7 @@
           </a:lstStyle>
           <a:p>
             <a:r>
-              <a:rPr lang="es-ES" smtClean="0"/>
+              <a:rPr lang="es-ES"/>
               <a:t>Haga clic para modificar el estilo de título del patrón</a:t>
             </a:r>
             <a:endParaRPr lang="es-CL"/>
@@ -3965,7 +3965,7 @@
           <a:p>
             <a:pPr lvl="0"/>
             <a:r>
-              <a:rPr lang="es-ES" smtClean="0"/>
+              <a:rPr lang="es-ES"/>
               <a:t>Haga clic para modificar el estilo de texto del patrón</a:t>
             </a:r>
           </a:p>
@@ -4024,35 +4024,35 @@
           <a:p>
             <a:pPr lvl="0"/>
             <a:r>
-              <a:rPr lang="es-ES" smtClean="0"/>
+              <a:rPr lang="es-ES"/>
               <a:t>Haga clic para modificar el estilo de texto del patrón</a:t>
             </a:r>
           </a:p>
           <a:p>
             <a:pPr lvl="1"/>
             <a:r>
-              <a:rPr lang="es-ES" smtClean="0"/>
+              <a:rPr lang="es-ES"/>
               <a:t>Segundo nivel</a:t>
             </a:r>
           </a:p>
           <a:p>
             <a:pPr lvl="2"/>
             <a:r>
-              <a:rPr lang="es-ES" smtClean="0"/>
+              <a:rPr lang="es-ES"/>
               <a:t>Tercer nivel</a:t>
             </a:r>
           </a:p>
           <a:p>
             <a:pPr lvl="3"/>
             <a:r>
-              <a:rPr lang="es-ES" smtClean="0"/>
+              <a:rPr lang="es-ES"/>
               <a:t>Cuarto nivel</a:t>
             </a:r>
           </a:p>
           <a:p>
             <a:pPr lvl="4"/>
             <a:r>
-              <a:rPr lang="es-ES" smtClean="0"/>
+              <a:rPr lang="es-ES"/>
               <a:t>Quinto nivel</a:t>
             </a:r>
             <a:endParaRPr lang="es-CL"/>
@@ -4121,7 +4121,7 @@
           <a:p>
             <a:pPr lvl="0"/>
             <a:r>
-              <a:rPr lang="es-ES" smtClean="0"/>
+              <a:rPr lang="es-ES"/>
               <a:t>Haga clic para modificar el estilo de texto del patrón</a:t>
             </a:r>
           </a:p>
@@ -4180,35 +4180,35 @@
           <a:p>
             <a:pPr lvl="0"/>
             <a:r>
-              <a:rPr lang="es-ES" smtClean="0"/>
+              <a:rPr lang="es-ES"/>
               <a:t>Haga clic para modificar el estilo de texto del patrón</a:t>
             </a:r>
           </a:p>
           <a:p>
             <a:pPr lvl="1"/>
             <a:r>
-              <a:rPr lang="es-ES" smtClean="0"/>
+              <a:rPr lang="es-ES"/>
               <a:t>Segundo nivel</a:t>
             </a:r>
           </a:p>
           <a:p>
             <a:pPr lvl="2"/>
             <a:r>
-              <a:rPr lang="es-ES" smtClean="0"/>
+              <a:rPr lang="es-ES"/>
               <a:t>Tercer nivel</a:t>
             </a:r>
           </a:p>
           <a:p>
             <a:pPr lvl="3"/>
             <a:r>
-              <a:rPr lang="es-ES" smtClean="0"/>
+              <a:rPr lang="es-ES"/>
               <a:t>Cuarto nivel</a:t>
             </a:r>
           </a:p>
           <a:p>
             <a:pPr lvl="4"/>
             <a:r>
-              <a:rPr lang="es-ES" smtClean="0"/>
+              <a:rPr lang="es-ES"/>
               <a:t>Quinto nivel</a:t>
             </a:r>
             <a:endParaRPr lang="es-CL"/>
@@ -4264,7 +4264,7 @@
           <a:lstStyle/>
           <a:p>
             <a:r>
-              <a:rPr lang="es-ES" smtClean="0"/>
+              <a:rPr lang="es-ES"/>
               <a:t>Haga clic para modificar el estilo de título del patrón</a:t>
             </a:r>
             <a:endParaRPr lang="es-CL"/>
@@ -4349,7 +4349,7 @@
           </a:lstStyle>
           <a:p>
             <a:r>
-              <a:rPr lang="es-ES" smtClean="0"/>
+              <a:rPr lang="es-ES"/>
               <a:t>Haga clic para modificar el estilo de título del patrón</a:t>
             </a:r>
             <a:endParaRPr lang="es-CL"/>
@@ -4409,35 +4409,35 @@
           <a:p>
             <a:pPr lvl="0"/>
             <a:r>
-              <a:rPr lang="es-ES" smtClean="0"/>
+              <a:rPr lang="es-ES"/>
               <a:t>Haga clic para modificar el estilo de texto del patrón</a:t>
             </a:r>
           </a:p>
           <a:p>
             <a:pPr lvl="1"/>
             <a:r>
-              <a:rPr lang="es-ES" smtClean="0"/>
+              <a:rPr lang="es-ES"/>
               <a:t>Segundo nivel</a:t>
             </a:r>
           </a:p>
           <a:p>
             <a:pPr lvl="2"/>
             <a:r>
-              <a:rPr lang="es-ES" smtClean="0"/>
+              <a:rPr lang="es-ES"/>
               <a:t>Tercer nivel</a:t>
             </a:r>
           </a:p>
           <a:p>
             <a:pPr lvl="3"/>
             <a:r>
-              <a:rPr lang="es-ES" smtClean="0"/>
+              <a:rPr lang="es-ES"/>
               <a:t>Cuarto nivel</a:t>
             </a:r>
           </a:p>
           <a:p>
             <a:pPr lvl="4"/>
             <a:r>
-              <a:rPr lang="es-ES" smtClean="0"/>
+              <a:rPr lang="es-ES"/>
               <a:t>Quinto nivel</a:t>
             </a:r>
             <a:endParaRPr lang="es-CL"/>
@@ -4506,7 +4506,7 @@
           <a:p>
             <a:pPr lvl="0"/>
             <a:r>
-              <a:rPr lang="es-ES" smtClean="0"/>
+              <a:rPr lang="es-ES"/>
               <a:t>Haga clic para modificar el estilo de texto del patrón</a:t>
             </a:r>
           </a:p>
@@ -4561,7 +4561,7 @@
           <a:lstStyle/>
           <a:p>
             <a:r>
-              <a:rPr lang="es-ES" smtClean="0"/>
+              <a:rPr lang="es-ES"/>
               <a:t>Haga clic para modificar el estilo de título del patrón</a:t>
             </a:r>
             <a:endParaRPr lang="es-CL"/>
@@ -4593,35 +4593,35 @@
           <a:p>
             <a:pPr lvl="0"/>
             <a:r>
-              <a:rPr lang="es-ES" smtClean="0"/>
+              <a:rPr lang="es-ES"/>
               <a:t>Haga clic para modificar el estilo de texto del patrón</a:t>
             </a:r>
           </a:p>
           <a:p>
             <a:pPr lvl="1"/>
             <a:r>
-              <a:rPr lang="es-ES" smtClean="0"/>
+              <a:rPr lang="es-ES"/>
               <a:t>Segundo nivel</a:t>
             </a:r>
           </a:p>
           <a:p>
             <a:pPr lvl="2"/>
             <a:r>
-              <a:rPr lang="es-ES" smtClean="0"/>
+              <a:rPr lang="es-ES"/>
               <a:t>Tercer nivel</a:t>
             </a:r>
           </a:p>
           <a:p>
             <a:pPr lvl="3"/>
             <a:r>
-              <a:rPr lang="es-ES" smtClean="0"/>
+              <a:rPr lang="es-ES"/>
               <a:t>Cuarto nivel</a:t>
             </a:r>
           </a:p>
           <a:p>
             <a:pPr lvl="4"/>
             <a:r>
-              <a:rPr lang="es-ES" smtClean="0"/>
+              <a:rPr lang="es-ES"/>
               <a:t>Quinto nivel</a:t>
             </a:r>
             <a:endParaRPr lang="es-CL"/>
@@ -4681,7 +4681,7 @@
           </a:lstStyle>
           <a:p>
             <a:r>
-              <a:rPr lang="es-ES" smtClean="0"/>
+              <a:rPr lang="es-ES"/>
               <a:t>Haga clic para modificar el estilo de título del patrón</a:t>
             </a:r>
             <a:endParaRPr lang="es-CL"/>
@@ -4749,7 +4749,7 @@
           </a:lstStyle>
           <a:p>
             <a:pPr lvl="0"/>
-            <a:endParaRPr lang="es-CL" noProof="0" smtClean="0"/>
+            <a:endParaRPr lang="es-CL" noProof="0"/>
           </a:p>
         </p:txBody>
       </p:sp>
@@ -4815,7 +4815,7 @@
           <a:p>
             <a:pPr lvl="0"/>
             <a:r>
-              <a:rPr lang="es-ES" smtClean="0"/>
+              <a:rPr lang="es-ES"/>
               <a:t>Haga clic para modificar el estilo de texto del patrón</a:t>
             </a:r>
           </a:p>
@@ -4870,7 +4870,7 @@
           <a:lstStyle/>
           <a:p>
             <a:r>
-              <a:rPr lang="es-ES" smtClean="0"/>
+              <a:rPr lang="es-ES"/>
               <a:t>Haga clic para modificar el estilo de título del patrón</a:t>
             </a:r>
             <a:endParaRPr lang="es-CL"/>
@@ -4902,35 +4902,35 @@
           <a:p>
             <a:pPr lvl="0"/>
             <a:r>
-              <a:rPr lang="es-ES" smtClean="0"/>
+              <a:rPr lang="es-ES"/>
               <a:t>Haga clic para modificar el estilo de texto del patrón</a:t>
             </a:r>
           </a:p>
           <a:p>
             <a:pPr lvl="1"/>
             <a:r>
-              <a:rPr lang="es-ES" smtClean="0"/>
+              <a:rPr lang="es-ES"/>
               <a:t>Segundo nivel</a:t>
             </a:r>
           </a:p>
           <a:p>
             <a:pPr lvl="2"/>
             <a:r>
-              <a:rPr lang="es-ES" smtClean="0"/>
+              <a:rPr lang="es-ES"/>
               <a:t>Tercer nivel</a:t>
             </a:r>
           </a:p>
           <a:p>
             <a:pPr lvl="3"/>
             <a:r>
-              <a:rPr lang="es-ES" smtClean="0"/>
+              <a:rPr lang="es-ES"/>
               <a:t>Cuarto nivel</a:t>
             </a:r>
           </a:p>
           <a:p>
             <a:pPr lvl="4"/>
             <a:r>
-              <a:rPr lang="es-ES" smtClean="0"/>
+              <a:rPr lang="es-ES"/>
               <a:t>Quinto nivel</a:t>
             </a:r>
             <a:endParaRPr lang="es-CL"/>
@@ -4986,7 +4986,7 @@
           <a:lstStyle/>
           <a:p>
             <a:r>
-              <a:rPr lang="es-ES" smtClean="0"/>
+              <a:rPr lang="es-ES"/>
               <a:t>Haga clic para modificar el estilo de título del patrón</a:t>
             </a:r>
             <a:endParaRPr lang="es-CL"/>
@@ -5018,35 +5018,35 @@
           <a:p>
             <a:pPr lvl="0"/>
             <a:r>
-              <a:rPr lang="es-ES" smtClean="0"/>
+              <a:rPr lang="es-ES"/>
               <a:t>Haga clic para modificar el estilo de texto del patrón</a:t>
             </a:r>
           </a:p>
           <a:p>
             <a:pPr lvl="1"/>
             <a:r>
-              <a:rPr lang="es-ES" smtClean="0"/>
+              <a:rPr lang="es-ES"/>
               <a:t>Segundo nivel</a:t>
             </a:r>
           </a:p>
           <a:p>
             <a:pPr lvl="2"/>
             <a:r>
-              <a:rPr lang="es-ES" smtClean="0"/>
+              <a:rPr lang="es-ES"/>
               <a:t>Tercer nivel</a:t>
             </a:r>
           </a:p>
           <a:p>
             <a:pPr lvl="3"/>
             <a:r>
-              <a:rPr lang="es-ES" smtClean="0"/>
+              <a:rPr lang="es-ES"/>
               <a:t>Cuarto nivel</a:t>
             </a:r>
           </a:p>
           <a:p>
             <a:pPr lvl="4"/>
             <a:r>
-              <a:rPr lang="es-ES" smtClean="0"/>
+              <a:rPr lang="es-ES"/>
               <a:t>Quinto nivel</a:t>
             </a:r>
             <a:endParaRPr lang="es-CL"/>
@@ -5106,7 +5106,7 @@
           </a:lstStyle>
           <a:p>
             <a:r>
-              <a:rPr lang="es-ES" smtClean="0"/>
+              <a:rPr lang="es-ES"/>
               <a:t>Haga clic para modificar el estilo de título del patrón</a:t>
             </a:r>
             <a:endParaRPr lang="es-CL"/>
@@ -5175,7 +5175,7 @@
           <a:p>
             <a:pPr lvl="0"/>
             <a:r>
-              <a:rPr lang="es-ES" smtClean="0"/>
+              <a:rPr lang="es-ES"/>
               <a:t>Haga clic para modificar el estilo de texto del patrón</a:t>
             </a:r>
           </a:p>
@@ -5230,7 +5230,7 @@
           <a:lstStyle/>
           <a:p>
             <a:r>
-              <a:rPr lang="es-ES" smtClean="0"/>
+              <a:rPr lang="es-ES"/>
               <a:t>Haga clic para modificar el estilo de título del patrón</a:t>
             </a:r>
             <a:endParaRPr lang="es-CL"/>
@@ -5290,35 +5290,35 @@
           <a:p>
             <a:pPr lvl="0"/>
             <a:r>
-              <a:rPr lang="es-ES" smtClean="0"/>
+              <a:rPr lang="es-ES"/>
               <a:t>Haga clic para modificar el estilo de texto del patrón</a:t>
             </a:r>
           </a:p>
           <a:p>
             <a:pPr lvl="1"/>
             <a:r>
-              <a:rPr lang="es-ES" smtClean="0"/>
+              <a:rPr lang="es-ES"/>
               <a:t>Segundo nivel</a:t>
             </a:r>
           </a:p>
           <a:p>
             <a:pPr lvl="2"/>
             <a:r>
-              <a:rPr lang="es-ES" smtClean="0"/>
+              <a:rPr lang="es-ES"/>
               <a:t>Tercer nivel</a:t>
             </a:r>
           </a:p>
           <a:p>
             <a:pPr lvl="3"/>
             <a:r>
-              <a:rPr lang="es-ES" smtClean="0"/>
+              <a:rPr lang="es-ES"/>
               <a:t>Cuarto nivel</a:t>
             </a:r>
           </a:p>
           <a:p>
             <a:pPr lvl="4"/>
             <a:r>
-              <a:rPr lang="es-ES" smtClean="0"/>
+              <a:rPr lang="es-ES"/>
               <a:t>Quinto nivel</a:t>
             </a:r>
             <a:endParaRPr lang="es-CL"/>
@@ -5378,35 +5378,35 @@
           <a:p>
             <a:pPr lvl="0"/>
             <a:r>
-              <a:rPr lang="es-ES" smtClean="0"/>
+              <a:rPr lang="es-ES"/>
               <a:t>Haga clic para modificar el estilo de texto del patrón</a:t>
             </a:r>
           </a:p>
           <a:p>
             <a:pPr lvl="1"/>
             <a:r>
-              <a:rPr lang="es-ES" smtClean="0"/>
+              <a:rPr lang="es-ES"/>
               <a:t>Segundo nivel</a:t>
             </a:r>
           </a:p>
           <a:p>
             <a:pPr lvl="2"/>
             <a:r>
-              <a:rPr lang="es-ES" smtClean="0"/>
+              <a:rPr lang="es-ES"/>
               <a:t>Tercer nivel</a:t>
             </a:r>
           </a:p>
           <a:p>
             <a:pPr lvl="3"/>
             <a:r>
-              <a:rPr lang="es-ES" smtClean="0"/>
+              <a:rPr lang="es-ES"/>
               <a:t>Cuarto nivel</a:t>
             </a:r>
           </a:p>
           <a:p>
             <a:pPr lvl="4"/>
             <a:r>
-              <a:rPr lang="es-ES" smtClean="0"/>
+              <a:rPr lang="es-ES"/>
               <a:t>Quinto nivel</a:t>
             </a:r>
             <a:endParaRPr lang="es-CL"/>
@@ -5466,7 +5466,7 @@
           </a:lstStyle>
           <a:p>
             <a:r>
-              <a:rPr lang="es-ES" smtClean="0"/>
+              <a:rPr lang="es-ES"/>
               <a:t>Haga clic para modificar el estilo de título del patrón</a:t>
             </a:r>
             <a:endParaRPr lang="es-CL"/>
@@ -5535,7 +5535,7 @@
           <a:p>
             <a:pPr lvl="0"/>
             <a:r>
-              <a:rPr lang="es-ES" smtClean="0"/>
+              <a:rPr lang="es-ES"/>
               <a:t>Haga clic para modificar el estilo de texto del patrón</a:t>
             </a:r>
           </a:p>
@@ -5594,35 +5594,35 @@
           <a:p>
             <a:pPr lvl="0"/>
             <a:r>
-              <a:rPr lang="es-ES" smtClean="0"/>
+              <a:rPr lang="es-ES"/>
               <a:t>Haga clic para modificar el estilo de texto del patrón</a:t>
             </a:r>
           </a:p>
           <a:p>
             <a:pPr lvl="1"/>
             <a:r>
-              <a:rPr lang="es-ES" smtClean="0"/>
+              <a:rPr lang="es-ES"/>
               <a:t>Segundo nivel</a:t>
             </a:r>
           </a:p>
           <a:p>
             <a:pPr lvl="2"/>
             <a:r>
-              <a:rPr lang="es-ES" smtClean="0"/>
+              <a:rPr lang="es-ES"/>
               <a:t>Tercer nivel</a:t>
             </a:r>
           </a:p>
           <a:p>
             <a:pPr lvl="3"/>
             <a:r>
-              <a:rPr lang="es-ES" smtClean="0"/>
+              <a:rPr lang="es-ES"/>
               <a:t>Cuarto nivel</a:t>
             </a:r>
           </a:p>
           <a:p>
             <a:pPr lvl="4"/>
             <a:r>
-              <a:rPr lang="es-ES" smtClean="0"/>
+              <a:rPr lang="es-ES"/>
               <a:t>Quinto nivel</a:t>
             </a:r>
             <a:endParaRPr lang="es-CL"/>
@@ -5691,7 +5691,7 @@
           <a:p>
             <a:pPr lvl="0"/>
             <a:r>
-              <a:rPr lang="es-ES" smtClean="0"/>
+              <a:rPr lang="es-ES"/>
               <a:t>Haga clic para modificar el estilo de texto del patrón</a:t>
             </a:r>
           </a:p>
@@ -5750,35 +5750,35 @@
           <a:p>
             <a:pPr lvl="0"/>
             <a:r>
-              <a:rPr lang="es-ES" smtClean="0"/>
+              <a:rPr lang="es-ES"/>
               <a:t>Haga clic para modificar el estilo de texto del patrón</a:t>
             </a:r>
           </a:p>
           <a:p>
             <a:pPr lvl="1"/>
             <a:r>
-              <a:rPr lang="es-ES" smtClean="0"/>
+              <a:rPr lang="es-ES"/>
               <a:t>Segundo nivel</a:t>
             </a:r>
           </a:p>
           <a:p>
             <a:pPr lvl="2"/>
             <a:r>
-              <a:rPr lang="es-ES" smtClean="0"/>
+              <a:rPr lang="es-ES"/>
               <a:t>Tercer nivel</a:t>
             </a:r>
           </a:p>
           <a:p>
             <a:pPr lvl="3"/>
             <a:r>
-              <a:rPr lang="es-ES" smtClean="0"/>
+              <a:rPr lang="es-ES"/>
               <a:t>Cuarto nivel</a:t>
             </a:r>
           </a:p>
           <a:p>
             <a:pPr lvl="4"/>
             <a:r>
-              <a:rPr lang="es-ES" smtClean="0"/>
+              <a:rPr lang="es-ES"/>
               <a:t>Quinto nivel</a:t>
             </a:r>
             <a:endParaRPr lang="es-CL"/>
@@ -5834,7 +5834,7 @@
           <a:lstStyle/>
           <a:p>
             <a:r>
-              <a:rPr lang="es-ES" smtClean="0"/>
+              <a:rPr lang="es-ES"/>
               <a:t>Haga clic para modificar el estilo de título del patrón</a:t>
             </a:r>
             <a:endParaRPr lang="es-CL"/>
@@ -5919,7 +5919,7 @@
           </a:lstStyle>
           <a:p>
             <a:r>
-              <a:rPr lang="es-ES" smtClean="0"/>
+              <a:rPr lang="es-ES"/>
               <a:t>Haga clic para modificar el estilo de título del patrón</a:t>
             </a:r>
             <a:endParaRPr lang="es-CL"/>
@@ -5979,35 +5979,35 @@
           <a:p>
             <a:pPr lvl="0"/>
             <a:r>
-              <a:rPr lang="es-ES" smtClean="0"/>
+              <a:rPr lang="es-ES"/>
               <a:t>Haga clic para modificar el estilo de texto del patrón</a:t>
             </a:r>
           </a:p>
           <a:p>
             <a:pPr lvl="1"/>
             <a:r>
-              <a:rPr lang="es-ES" smtClean="0"/>
+              <a:rPr lang="es-ES"/>
               <a:t>Segundo nivel</a:t>
             </a:r>
           </a:p>
           <a:p>
             <a:pPr lvl="2"/>
             <a:r>
-              <a:rPr lang="es-ES" smtClean="0"/>
+              <a:rPr lang="es-ES"/>
               <a:t>Tercer nivel</a:t>
             </a:r>
           </a:p>
           <a:p>
             <a:pPr lvl="3"/>
             <a:r>
-              <a:rPr lang="es-ES" smtClean="0"/>
+              <a:rPr lang="es-ES"/>
               <a:t>Cuarto nivel</a:t>
             </a:r>
           </a:p>
           <a:p>
             <a:pPr lvl="4"/>
             <a:r>
-              <a:rPr lang="es-ES" smtClean="0"/>
+              <a:rPr lang="es-ES"/>
               <a:t>Quinto nivel</a:t>
             </a:r>
             <a:endParaRPr lang="es-CL"/>
@@ -6076,7 +6076,7 @@
           <a:p>
             <a:pPr lvl="0"/>
             <a:r>
-              <a:rPr lang="es-ES" smtClean="0"/>
+              <a:rPr lang="es-ES"/>
               <a:t>Haga clic para modificar el estilo de texto del patrón</a:t>
             </a:r>
           </a:p>
@@ -6135,7 +6135,7 @@
           </a:lstStyle>
           <a:p>
             <a:r>
-              <a:rPr lang="es-ES" smtClean="0"/>
+              <a:rPr lang="es-ES"/>
               <a:t>Haga clic para modificar el estilo de título del patrón</a:t>
             </a:r>
             <a:endParaRPr lang="es-CL"/>
@@ -6203,7 +6203,7 @@
           </a:lstStyle>
           <a:p>
             <a:pPr lvl="0"/>
-            <a:endParaRPr lang="es-CL" noProof="0" smtClean="0"/>
+            <a:endParaRPr lang="es-CL" noProof="0"/>
           </a:p>
         </p:txBody>
       </p:sp>
@@ -6269,7 +6269,7 @@
           <a:p>
             <a:pPr lvl="0"/>
             <a:r>
-              <a:rPr lang="es-ES" smtClean="0"/>
+              <a:rPr lang="es-ES"/>
               <a:t>Haga clic para modificar el estilo de texto del patrón</a:t>
             </a:r>
           </a:p>
@@ -6324,13 +6324,6 @@
     <p:sldLayoutId id="2147483661" r:id="rId10"/>
     <p:sldLayoutId id="2147483662" r:id="rId11"/>
   </p:sldLayoutIdLst>
-  <p:timing>
-    <p:tnLst>
-      <p:par>
-        <p:cTn id="1" dur="indefinite" restart="never" nodeType="tmRoot"/>
-      </p:par>
-    </p:tnLst>
-  </p:timing>
   <p:txStyles>
     <p:titleStyle>
       <a:lvl1pPr algn="ctr" rtl="0" eaLnBrk="0" fontAlgn="base" hangingPunct="0">
@@ -7229,13 +7222,6 @@
     <p:sldLayoutId id="2147483672" r:id="rId10"/>
     <p:sldLayoutId id="2147483673" r:id="rId11"/>
   </p:sldLayoutIdLst>
-  <p:timing>
-    <p:tnLst>
-      <p:par>
-        <p:cTn id="1" dur="indefinite" restart="never" nodeType="tmRoot"/>
-      </p:par>
-    </p:tnLst>
-  </p:timing>
   <p:txStyles>
     <p:titleStyle>
       <a:lvl1pPr algn="ctr" rtl="0" eaLnBrk="0" fontAlgn="base" hangingPunct="0">
@@ -7644,8 +7630,8 @@
         </p:nvSpPr>
         <p:spPr bwMode="auto">
           <a:xfrm>
-            <a:off x="2550223" y="1690179"/>
-            <a:ext cx="4010232" cy="3724096"/>
+            <a:off x="2549021" y="1690179"/>
+            <a:ext cx="4012637" cy="3539430"/>
           </a:xfrm>
           <a:prstGeom prst="rect">
             <a:avLst/>
@@ -7666,7 +7652,7 @@
           <a:p>
             <a:pPr algn="ctr"/>
             <a:r>
-              <a:rPr lang="es-CL" sz="2400" dirty="0" smtClean="0">
+              <a:rPr lang="es-CL" sz="2400" dirty="0">
                 <a:solidFill>
                   <a:srgbClr val="FF0000"/>
                 </a:solidFill>
@@ -7675,7 +7661,7 @@
               <a:t>P</a:t>
             </a:r>
             <a:r>
-              <a:rPr lang="es-CL" sz="2400" dirty="0" smtClean="0">
+              <a:rPr lang="es-CL" sz="2400" dirty="0">
                 <a:solidFill>
                   <a:srgbClr val="3366FF"/>
                 </a:solidFill>
@@ -7684,7 +7670,7 @@
               <a:t>r</a:t>
             </a:r>
             <a:r>
-              <a:rPr lang="es-CL" sz="2400" dirty="0" smtClean="0">
+              <a:rPr lang="es-CL" sz="2400" dirty="0">
                 <a:solidFill>
                   <a:srgbClr val="FFFF00"/>
                 </a:solidFill>
@@ -7693,7 +7679,7 @@
               <a:t>o</a:t>
             </a:r>
             <a:r>
-              <a:rPr lang="es-CL" sz="2400" dirty="0" smtClean="0">
+              <a:rPr lang="es-CL" sz="2400" dirty="0">
                 <a:solidFill>
                   <a:srgbClr val="00FF00"/>
                 </a:solidFill>
@@ -7702,7 +7688,7 @@
               <a:t>c</a:t>
             </a:r>
             <a:r>
-              <a:rPr lang="es-CL" sz="2400" dirty="0" smtClean="0">
+              <a:rPr lang="es-CL" sz="2400" dirty="0">
                 <a:solidFill>
                   <a:schemeClr val="bg1"/>
                 </a:solidFill>
@@ -7711,7 +7697,7 @@
               <a:t>e</a:t>
             </a:r>
             <a:r>
-              <a:rPr lang="es-CL" sz="2400" dirty="0" smtClean="0">
+              <a:rPr lang="es-CL" sz="2400" dirty="0">
                 <a:solidFill>
                   <a:srgbClr val="FF6600"/>
                 </a:solidFill>
@@ -7720,7 +7706,7 @@
               <a:t>s</a:t>
             </a:r>
             <a:r>
-              <a:rPr lang="es-CL" sz="2400" dirty="0" smtClean="0">
+              <a:rPr lang="es-CL" sz="2400" dirty="0">
                 <a:solidFill>
                   <a:srgbClr val="FF0000"/>
                 </a:solidFill>
@@ -7729,7 +7715,7 @@
               <a:t>a</a:t>
             </a:r>
             <a:r>
-              <a:rPr lang="es-CL" sz="2400" dirty="0" smtClean="0">
+              <a:rPr lang="es-CL" sz="2400" dirty="0">
                 <a:solidFill>
                   <a:srgbClr val="3366FF"/>
                 </a:solidFill>
@@ -7738,7 +7724,7 @@
               <a:t>m</a:t>
             </a:r>
             <a:r>
-              <a:rPr lang="es-CL" sz="2400" dirty="0" smtClean="0">
+              <a:rPr lang="es-CL" sz="2400" dirty="0">
                 <a:solidFill>
                   <a:srgbClr val="FFFF00"/>
                 </a:solidFill>
@@ -7747,7 +7733,7 @@
               <a:t>i</a:t>
             </a:r>
             <a:r>
-              <a:rPr lang="es-CL" sz="2400" dirty="0" smtClean="0">
+              <a:rPr lang="es-CL" sz="2400" dirty="0">
                 <a:solidFill>
                   <a:srgbClr val="00FF00"/>
                 </a:solidFill>
@@ -7756,7 +7742,7 @@
               <a:t>e</a:t>
             </a:r>
             <a:r>
-              <a:rPr lang="es-CL" sz="2400" dirty="0" smtClean="0">
+              <a:rPr lang="es-CL" sz="2400" dirty="0">
                 <a:solidFill>
                   <a:schemeClr val="bg1"/>
                 </a:solidFill>
@@ -7765,7 +7751,7 @@
               <a:t>n</a:t>
             </a:r>
             <a:r>
-              <a:rPr lang="es-CL" sz="2400" dirty="0" smtClean="0">
+              <a:rPr lang="es-CL" sz="2400" dirty="0">
                 <a:solidFill>
                   <a:srgbClr val="FF6600"/>
                 </a:solidFill>
@@ -7774,7 +7760,7 @@
               <a:t>t</a:t>
             </a:r>
             <a:r>
-              <a:rPr lang="es-CL" sz="2400" dirty="0" smtClean="0">
+              <a:rPr lang="es-CL" sz="2400" dirty="0">
                 <a:solidFill>
                   <a:srgbClr val="FF0000"/>
                 </a:solidFill>
@@ -7783,7 +7769,7 @@
               <a:t>o</a:t>
             </a:r>
             <a:r>
-              <a:rPr lang="es-CL" sz="2400" dirty="0" smtClean="0">
+              <a:rPr lang="es-CL" sz="2400" dirty="0">
                 <a:solidFill>
                   <a:srgbClr val="3333CC"/>
                 </a:solidFill>
@@ -7792,7 +7778,7 @@
               <a:t> </a:t>
             </a:r>
             <a:r>
-              <a:rPr lang="es-CL" sz="2400" dirty="0" smtClean="0">
+              <a:rPr lang="es-CL" sz="2400" dirty="0">
                 <a:solidFill>
                   <a:srgbClr val="3366FF"/>
                 </a:solidFill>
@@ -7801,7 +7787,7 @@
               <a:t>d</a:t>
             </a:r>
             <a:r>
-              <a:rPr lang="es-CL" sz="2400" dirty="0" smtClean="0">
+              <a:rPr lang="es-CL" sz="2400" dirty="0">
                 <a:solidFill>
                   <a:srgbClr val="FFFF00"/>
                 </a:solidFill>
@@ -7810,7 +7796,7 @@
               <a:t>e </a:t>
             </a:r>
             <a:r>
-              <a:rPr lang="es-CL" sz="2400" dirty="0" smtClean="0">
+              <a:rPr lang="es-CL" sz="2400" dirty="0">
                 <a:solidFill>
                   <a:srgbClr val="00FF00"/>
                 </a:solidFill>
@@ -7819,7 +7805,7 @@
               <a:t>I</a:t>
             </a:r>
             <a:r>
-              <a:rPr lang="es-CL" sz="2400" dirty="0" smtClean="0">
+              <a:rPr lang="es-CL" sz="2400" dirty="0">
                 <a:solidFill>
                   <a:schemeClr val="bg1"/>
                 </a:solidFill>
@@ -7828,7 +7814,7 @@
               <a:t>m</a:t>
             </a:r>
             <a:r>
-              <a:rPr lang="es-CL" sz="2400" dirty="0" smtClean="0">
+              <a:rPr lang="es-CL" sz="2400" dirty="0">
                 <a:solidFill>
                   <a:srgbClr val="FF6600"/>
                 </a:solidFill>
@@ -7837,7 +7823,7 @@
               <a:t>á</a:t>
             </a:r>
             <a:r>
-              <a:rPr lang="es-CL" sz="2400" dirty="0" smtClean="0">
+              <a:rPr lang="es-CL" sz="2400" dirty="0">
                 <a:solidFill>
                   <a:srgbClr val="FF0000"/>
                 </a:solidFill>
@@ -7846,7 +7832,7 @@
               <a:t>g</a:t>
             </a:r>
             <a:r>
-              <a:rPr lang="es-CL" sz="2400" dirty="0" smtClean="0">
+              <a:rPr lang="es-CL" sz="2400" dirty="0">
                 <a:solidFill>
                   <a:srgbClr val="3366FF"/>
                 </a:solidFill>
@@ -7855,7 +7841,7 @@
               <a:t>e</a:t>
             </a:r>
             <a:r>
-              <a:rPr lang="es-CL" sz="2400" dirty="0" smtClean="0">
+              <a:rPr lang="es-CL" sz="2400" dirty="0">
                 <a:solidFill>
                   <a:srgbClr val="FFFF00"/>
                 </a:solidFill>
@@ -7864,7 +7850,7 @@
               <a:t>n</a:t>
             </a:r>
             <a:r>
-              <a:rPr lang="es-CL" sz="2400" dirty="0" smtClean="0">
+              <a:rPr lang="es-CL" sz="2400" dirty="0">
                 <a:solidFill>
                   <a:srgbClr val="00FF00"/>
                 </a:solidFill>
@@ -7873,7 +7859,7 @@
               <a:t>e</a:t>
             </a:r>
             <a:r>
-              <a:rPr lang="es-CL" sz="2400" dirty="0" smtClean="0">
+              <a:rPr lang="es-CL" sz="2400" dirty="0">
                 <a:solidFill>
                   <a:schemeClr val="bg1"/>
                 </a:solidFill>
@@ -7881,7 +7867,7 @@
               </a:rPr>
               <a:t>s</a:t>
             </a:r>
-            <a:endParaRPr lang="es-CL" sz="2400" dirty="0" smtClean="0">
+            <a:endParaRPr lang="es-CL" sz="2400" dirty="0">
               <a:solidFill>
                 <a:srgbClr val="FF0000"/>
               </a:solidFill>
@@ -7891,7 +7877,7 @@
           <a:p>
             <a:pPr algn="ctr"/>
             <a:r>
-              <a:rPr lang="es-CL" sz="2400" dirty="0" smtClean="0">
+              <a:rPr lang="es-CL" sz="2400" dirty="0">
                 <a:solidFill>
                   <a:schemeClr val="bg2">
                     <a:lumMod val="60000"/>
@@ -7902,19 +7888,10 @@
               </a:rPr>
               <a:t> </a:t>
             </a:r>
+          </a:p>
+          <a:p>
+            <a:pPr algn="ctr"/>
             <a:endParaRPr lang="es-CL" sz="2400" dirty="0">
-              <a:solidFill>
-                <a:schemeClr val="bg2">
-                  <a:lumMod val="60000"/>
-                  <a:lumOff val="40000"/>
-                </a:schemeClr>
-              </a:solidFill>
-              <a:latin typeface="Trebuchet MS" pitchFamily="34" charset="0"/>
-            </a:endParaRPr>
-          </a:p>
-          <a:p>
-            <a:pPr algn="ctr"/>
-            <a:endParaRPr lang="es-CL" sz="2400" dirty="0" smtClean="0">
               <a:solidFill>
                 <a:srgbClr val="3333CC"/>
               </a:solidFill>
@@ -7985,7 +7962,7 @@
           <a:p>
             <a:pPr algn="ctr"/>
             <a:r>
-              <a:rPr lang="es-CL" sz="1200" dirty="0" smtClean="0">
+              <a:rPr lang="es-CL" sz="1200" dirty="0">
                 <a:solidFill>
                   <a:schemeClr val="bg1">
                     <a:lumMod val="75000"/>
@@ -7995,19 +7972,11 @@
               </a:rPr>
               <a:t>Departmento de Ciencia de la Computación</a:t>
             </a:r>
-            <a:endParaRPr lang="es-CL" sz="1200" dirty="0">
-              <a:solidFill>
-                <a:schemeClr val="bg1">
-                  <a:lumMod val="75000"/>
-                </a:schemeClr>
-              </a:solidFill>
-              <a:latin typeface="Trebuchet MS" pitchFamily="34" charset="0"/>
-            </a:endParaRPr>
           </a:p>
           <a:p>
             <a:pPr algn="ctr"/>
             <a:r>
-              <a:rPr lang="es-CL" sz="1200" dirty="0" smtClean="0">
+              <a:rPr lang="es-CL" sz="1200" dirty="0">
                 <a:solidFill>
                   <a:schemeClr val="bg1">
                     <a:lumMod val="75000"/>
@@ -8021,7 +7990,7 @@
           <a:p>
             <a:pPr algn="ctr"/>
             <a:r>
-              <a:rPr lang="es-CL" sz="1200" dirty="0" smtClean="0">
+              <a:rPr lang="es-CL" sz="1200" dirty="0">
                 <a:solidFill>
                   <a:schemeClr val="bg1">
                     <a:lumMod val="75000"/>
@@ -8031,36 +8000,6 @@
               </a:rPr>
               <a:t>Universidad Católica de Chile</a:t>
             </a:r>
-            <a:endParaRPr lang="es-CL" sz="1200" dirty="0">
-              <a:solidFill>
-                <a:schemeClr val="bg1">
-                  <a:lumMod val="75000"/>
-                </a:schemeClr>
-              </a:solidFill>
-              <a:latin typeface="Trebuchet MS" pitchFamily="34" charset="0"/>
-            </a:endParaRPr>
-          </a:p>
-          <a:p>
-            <a:pPr algn="ctr"/>
-            <a:r>
-              <a:rPr lang="es-CL" sz="1200" dirty="0" smtClean="0">
-                <a:solidFill>
-                  <a:schemeClr val="bg1">
-                    <a:lumMod val="75000"/>
-                  </a:schemeClr>
-                </a:solidFill>
-                <a:latin typeface="Trebuchet MS" pitchFamily="34" charset="0"/>
-              </a:rPr>
-              <a:t>Semestre 2018-2</a:t>
-            </a:r>
-            <a:endParaRPr lang="en-US" sz="1200" dirty="0">
-              <a:solidFill>
-                <a:schemeClr val="bg1">
-                  <a:lumMod val="75000"/>
-                </a:schemeClr>
-              </a:solidFill>
-              <a:latin typeface="Trebuchet MS" pitchFamily="34" charset="0"/>
-            </a:endParaRPr>
           </a:p>
         </p:txBody>
       </p:sp>
@@ -8088,7 +8027,7 @@
           <a:p>
             <a:pPr algn="ctr"/>
             <a:r>
-              <a:rPr lang="es-CL" sz="2400" b="1" smtClean="0">
+              <a:rPr lang="es-CL" sz="2400" b="1">
                 <a:solidFill>
                   <a:srgbClr val="FFFFFF"/>
                 </a:solidFill>
@@ -9054,13 +8993,6 @@
   <p:clrMapOvr>
     <a:masterClrMapping/>
   </p:clrMapOvr>
-  <p:timing>
-    <p:tnLst>
-      <p:par>
-        <p:cTn id="1" dur="indefinite" restart="never" nodeType="tmRoot"/>
-      </p:par>
-    </p:tnLst>
-  </p:timing>
 </p:sld>
 </file>
 
@@ -9291,13 +9223,6 @@
   <p:clrMapOvr>
     <a:masterClrMapping/>
   </p:clrMapOvr>
-  <p:timing>
-    <p:tnLst>
-      <p:par>
-        <p:cTn id="1" dur="indefinite" restart="never" nodeType="tmRoot"/>
-      </p:par>
-    </p:tnLst>
-  </p:timing>
 </p:sld>
 </file>
 
@@ -9472,13 +9397,6 @@
   <p:clrMapOvr>
     <a:masterClrMapping/>
   </p:clrMapOvr>
-  <p:timing>
-    <p:tnLst>
-      <p:par>
-        <p:cTn id="1" dur="indefinite" restart="never" nodeType="tmRoot"/>
-      </p:par>
-    </p:tnLst>
-  </p:timing>
 </p:sld>
 </file>
 
@@ -9653,13 +9571,6 @@
   <p:clrMapOvr>
     <a:masterClrMapping/>
   </p:clrMapOvr>
-  <p:timing>
-    <p:tnLst>
-      <p:par>
-        <p:cTn id="1" dur="indefinite" restart="never" nodeType="tmRoot"/>
-      </p:par>
-    </p:tnLst>
-  </p:timing>
 </p:sld>
 </file>
 
@@ -9720,29 +9631,11 @@
                 </a:solidFill>
                 <a:latin typeface="Trebuchet MS" charset="0"/>
               </a:rPr>
-              <a:t>3</a:t>
-            </a:r>
-            <a:r>
-              <a:rPr lang="es-ES" b="1" dirty="0" smtClean="0">
-                <a:solidFill>
-                  <a:schemeClr val="accent2"/>
-                </a:solidFill>
-                <a:latin typeface="Trebuchet MS" charset="0"/>
-              </a:rPr>
-              <a:t>. </a:t>
-            </a:r>
-            <a:r>
-              <a:rPr lang="es-ES" b="1" dirty="0">
-                <a:solidFill>
-                  <a:schemeClr val="accent2"/>
-                </a:solidFill>
-                <a:latin typeface="Trebuchet MS" charset="0"/>
-              </a:rPr>
-              <a:t>Mejoramiento de imágenes en el dominio del espacio</a:t>
-            </a:r>
-          </a:p>
-          <a:p>
-            <a:endParaRPr lang="es-ES" b="1" dirty="0" smtClean="0">
+              <a:t>3. Mejoramiento de imágenes en el dominio del espacio</a:t>
+            </a:r>
+          </a:p>
+          <a:p>
+            <a:endParaRPr lang="es-ES" b="1" dirty="0">
               <a:solidFill>
                 <a:schemeClr val="accent2"/>
               </a:solidFill>
@@ -9757,37 +9650,27 @@
                 </a:solidFill>
                 <a:latin typeface="Trebuchet MS" charset="0"/>
               </a:rPr>
-              <a:t>3</a:t>
-            </a:r>
-            <a:r>
-              <a:rPr lang="es-ES" sz="1400" b="1" dirty="0" smtClean="0">
-                <a:solidFill>
-                  <a:schemeClr val="accent2"/>
-                </a:solidFill>
-                <a:latin typeface="Trebuchet MS" charset="0"/>
-              </a:rPr>
-              <a:t>.1 </a:t>
-            </a:r>
-            <a:r>
+              <a:t>3.1 Transformaciones básicas de niveles de grises e histogramas</a:t>
+            </a:r>
+            <a:br>
               <a:rPr lang="es-ES" sz="1400" b="1" dirty="0">
                 <a:solidFill>
                   <a:schemeClr val="accent2"/>
                 </a:solidFill>
                 <a:latin typeface="Trebuchet MS" charset="0"/>
               </a:rPr>
-              <a:t>Transformaciones básicas de niveles de grises e histogramas</a:t>
-            </a:r>
-            <a:r>
-              <a:rPr lang="es-ES" sz="1400" b="1" dirty="0" smtClean="0">
-                <a:solidFill>
-                  <a:schemeClr val="accent2"/>
-                </a:solidFill>
-                <a:latin typeface="Trebuchet MS" charset="0"/>
-              </a:rPr>
-              <a:t/>
+            </a:br>
+            <a:r>
+              <a:rPr lang="es-ES" sz="1400" b="1" dirty="0">
+                <a:solidFill>
+                  <a:schemeClr val="accent2"/>
+                </a:solidFill>
+                <a:latin typeface="Trebuchet MS" charset="0"/>
+              </a:rPr>
+              <a:t>3.2 Mejoramiento empleando operaciones aritméticas y lógicas</a:t>
             </a:r>
             <a:br>
-              <a:rPr lang="es-ES" sz="1400" b="1" dirty="0" smtClean="0">
+              <a:rPr lang="es-ES" sz="1400" b="1" dirty="0">
                 <a:solidFill>
                   <a:schemeClr val="accent2"/>
                 </a:solidFill>
@@ -9795,57 +9678,13 @@
               </a:rPr>
             </a:br>
             <a:r>
-              <a:rPr lang="es-ES" sz="1400" b="1" dirty="0" smtClean="0">
-                <a:solidFill>
-                  <a:schemeClr val="accent2"/>
-                </a:solidFill>
-                <a:latin typeface="Trebuchet MS" charset="0"/>
-              </a:rPr>
-              <a:t>3.2 </a:t>
-            </a:r>
-            <a:r>
               <a:rPr lang="es-ES" sz="1400" b="1" dirty="0">
                 <a:solidFill>
                   <a:schemeClr val="accent2"/>
                 </a:solidFill>
                 <a:latin typeface="Trebuchet MS" charset="0"/>
               </a:rPr>
-              <a:t>Mejoramiento empleando operaciones aritméticas y lógicas</a:t>
-            </a:r>
-            <a:r>
-              <a:rPr lang="es-ES" sz="1400" b="1" dirty="0" smtClean="0">
-                <a:solidFill>
-                  <a:schemeClr val="accent2"/>
-                </a:solidFill>
-                <a:latin typeface="Trebuchet MS" charset="0"/>
-              </a:rPr>
-              <a:t/>
-            </a:r>
-            <a:br>
-              <a:rPr lang="es-ES" sz="1400" b="1" dirty="0" smtClean="0">
-                <a:solidFill>
-                  <a:schemeClr val="accent2"/>
-                </a:solidFill>
-                <a:latin typeface="Trebuchet MS" charset="0"/>
-              </a:rPr>
-            </a:br>
-            <a:r>
-              <a:rPr lang="es-ES" sz="1400" b="1" dirty="0" smtClean="0">
-                <a:solidFill>
-                  <a:schemeClr val="accent2"/>
-                </a:solidFill>
-                <a:latin typeface="Trebuchet MS" charset="0"/>
-              </a:rPr>
-              <a:t>3.3 </a:t>
-            </a:r>
-            <a:r>
-              <a:rPr lang="es-ES" sz="1400" b="1" dirty="0">
-                <a:solidFill>
-                  <a:schemeClr val="accent2"/>
-                </a:solidFill>
-                <a:latin typeface="Trebuchet MS" charset="0"/>
-              </a:rPr>
-              <a:t>Filtros espaciales de suavización y agudización</a:t>
+              <a:t>3.3 Filtros espaciales de suavización y agudización</a:t>
             </a:r>
           </a:p>
         </p:txBody>
@@ -9906,13 +9745,6 @@
   <p:clrMapOvr>
     <a:masterClrMapping/>
   </p:clrMapOvr>
-  <p:timing>
-    <p:tnLst>
-      <p:par>
-        <p:cTn id="1" dur="indefinite" restart="never" nodeType="tmRoot"/>
-      </p:par>
-    </p:tnLst>
-  </p:timing>
 </p:sld>
 </file>
 
@@ -9967,26 +9799,17 @@
           <a:lstStyle/>
           <a:p>
             <a:r>
-              <a:rPr lang="es-ES" b="1" dirty="0" smtClean="0">
-                <a:solidFill>
-                  <a:schemeClr val="accent2"/>
-                </a:solidFill>
-                <a:latin typeface="Trebuchet MS" charset="0"/>
-              </a:rPr>
-              <a:t>4. </a:t>
-            </a:r>
-            <a:r>
               <a:rPr lang="es-ES" b="1" dirty="0">
                 <a:solidFill>
                   <a:schemeClr val="accent2"/>
                 </a:solidFill>
                 <a:latin typeface="Trebuchet MS" charset="0"/>
               </a:rPr>
-              <a:t>Introducción a sistemas lineales</a:t>
-            </a:r>
-          </a:p>
-          <a:p>
-            <a:endParaRPr lang="es-ES" b="1" dirty="0" smtClean="0">
+              <a:t>4. Introducción a sistemas lineales</a:t>
+            </a:r>
+          </a:p>
+          <a:p>
+            <a:endParaRPr lang="es-ES" b="1" dirty="0">
               <a:solidFill>
                 <a:schemeClr val="accent2"/>
               </a:solidFill>
@@ -10001,37 +9824,27 @@
                 </a:solidFill>
                 <a:latin typeface="Trebuchet MS" charset="0"/>
               </a:rPr>
-              <a:t>4</a:t>
-            </a:r>
-            <a:r>
-              <a:rPr lang="es-ES" sz="1400" b="1" dirty="0" smtClean="0">
-                <a:solidFill>
-                  <a:schemeClr val="accent2"/>
-                </a:solidFill>
-                <a:latin typeface="Trebuchet MS" charset="0"/>
-              </a:rPr>
-              <a:t>.1 </a:t>
-            </a:r>
-            <a:r>
+              <a:t>4.1 Respuesta al impulso</a:t>
+            </a:r>
+            <a:br>
               <a:rPr lang="es-ES" sz="1400" b="1" dirty="0">
                 <a:solidFill>
                   <a:schemeClr val="accent2"/>
                 </a:solidFill>
                 <a:latin typeface="Trebuchet MS" charset="0"/>
               </a:rPr>
-              <a:t>Respuesta al impulso</a:t>
-            </a:r>
-            <a:r>
-              <a:rPr lang="es-ES" sz="1400" b="1" dirty="0" smtClean="0">
-                <a:solidFill>
-                  <a:schemeClr val="accent2"/>
-                </a:solidFill>
-                <a:latin typeface="Trebuchet MS" charset="0"/>
-              </a:rPr>
-              <a:t/>
+            </a:br>
+            <a:r>
+              <a:rPr lang="es-ES" sz="1400" b="1" dirty="0">
+                <a:solidFill>
+                  <a:schemeClr val="accent2"/>
+                </a:solidFill>
+                <a:latin typeface="Trebuchet MS" charset="0"/>
+              </a:rPr>
+              <a:t>4.2 Convolución continua y discreta unidimensional y sus propiedades</a:t>
             </a:r>
             <a:br>
-              <a:rPr lang="es-ES" sz="1400" b="1" dirty="0" smtClean="0">
+              <a:rPr lang="es-ES" sz="1400" b="1" dirty="0">
                 <a:solidFill>
                   <a:schemeClr val="accent2"/>
                 </a:solidFill>
@@ -10039,34 +9852,16 @@
               </a:rPr>
             </a:br>
             <a:r>
-              <a:rPr lang="es-ES" sz="1400" b="1" dirty="0" smtClean="0">
-                <a:solidFill>
-                  <a:schemeClr val="accent2"/>
-                </a:solidFill>
-                <a:latin typeface="Trebuchet MS" charset="0"/>
-              </a:rPr>
-              <a:t>4.2 </a:t>
-            </a:r>
-            <a:r>
               <a:rPr lang="es-ES" sz="1400" b="1" dirty="0">
                 <a:solidFill>
                   <a:schemeClr val="accent2"/>
                 </a:solidFill>
                 <a:latin typeface="Trebuchet MS" charset="0"/>
               </a:rPr>
-              <a:t>Convolución continua y discreta unidimensional y sus propiedades</a:t>
-            </a:r>
-            <a:r>
-              <a:rPr lang="es-ES" sz="1400" b="1" dirty="0" smtClean="0">
-                <a:solidFill>
-                  <a:schemeClr val="accent2"/>
-                </a:solidFill>
-                <a:latin typeface="Trebuchet MS" charset="0"/>
-              </a:rPr>
-              <a:t/>
+              <a:t>4.3 Convolución continua y discreta bidimensional y sus propiedades</a:t>
             </a:r>
             <a:br>
-              <a:rPr lang="es-ES" sz="1400" b="1" dirty="0" smtClean="0">
+              <a:rPr lang="es-ES" sz="1400" b="1" dirty="0">
                 <a:solidFill>
                   <a:schemeClr val="accent2"/>
                 </a:solidFill>
@@ -10074,34 +9869,16 @@
               </a:rPr>
             </a:br>
             <a:r>
-              <a:rPr lang="es-ES" sz="1400" b="1" dirty="0" smtClean="0">
-                <a:solidFill>
-                  <a:schemeClr val="accent2"/>
-                </a:solidFill>
-                <a:latin typeface="Trebuchet MS" charset="0"/>
-              </a:rPr>
-              <a:t>4.3 </a:t>
-            </a:r>
-            <a:r>
               <a:rPr lang="es-ES" sz="1400" b="1" dirty="0">
                 <a:solidFill>
                   <a:schemeClr val="accent2"/>
                 </a:solidFill>
                 <a:latin typeface="Trebuchet MS" charset="0"/>
               </a:rPr>
-              <a:t>Convolución continua y discreta bidimensional y sus propiedades</a:t>
-            </a:r>
-            <a:r>
-              <a:rPr lang="es-ES" sz="1400" b="1" dirty="0" smtClean="0">
-                <a:solidFill>
-                  <a:schemeClr val="accent2"/>
-                </a:solidFill>
-                <a:latin typeface="Trebuchet MS" charset="0"/>
-              </a:rPr>
-              <a:t/>
+              <a:t>4.4 Transformada de Fourier unidimensional y sus propiedades</a:t>
             </a:r>
             <a:br>
-              <a:rPr lang="es-ES" sz="1400" b="1" dirty="0" smtClean="0">
+              <a:rPr lang="es-ES" sz="1400" b="1" dirty="0">
                 <a:solidFill>
                   <a:schemeClr val="accent2"/>
                 </a:solidFill>
@@ -10109,34 +9886,16 @@
               </a:rPr>
             </a:br>
             <a:r>
-              <a:rPr lang="es-ES" sz="1400" b="1" dirty="0" smtClean="0">
-                <a:solidFill>
-                  <a:schemeClr val="accent2"/>
-                </a:solidFill>
-                <a:latin typeface="Trebuchet MS" charset="0"/>
-              </a:rPr>
-              <a:t>4.4 </a:t>
-            </a:r>
-            <a:r>
               <a:rPr lang="es-ES" sz="1400" b="1" dirty="0">
                 <a:solidFill>
                   <a:schemeClr val="accent2"/>
                 </a:solidFill>
                 <a:latin typeface="Trebuchet MS" charset="0"/>
               </a:rPr>
-              <a:t>Transformada de Fourier unidimensional y sus propiedades</a:t>
-            </a:r>
-            <a:r>
-              <a:rPr lang="es-ES" sz="1400" b="1" dirty="0" smtClean="0">
-                <a:solidFill>
-                  <a:schemeClr val="accent2"/>
-                </a:solidFill>
-                <a:latin typeface="Trebuchet MS" charset="0"/>
-              </a:rPr>
-              <a:t/>
+              <a:t>4.5 Transformada de Fourier bidimensional y sus propiedades</a:t>
             </a:r>
             <a:br>
-              <a:rPr lang="es-ES" sz="1400" b="1" dirty="0" smtClean="0">
+              <a:rPr lang="es-ES" sz="1400" b="1" dirty="0">
                 <a:solidFill>
                   <a:schemeClr val="accent2"/>
                 </a:solidFill>
@@ -10144,57 +9903,13 @@
               </a:rPr>
             </a:br>
             <a:r>
-              <a:rPr lang="es-ES" sz="1400" b="1" dirty="0" smtClean="0">
-                <a:solidFill>
-                  <a:schemeClr val="accent2"/>
-                </a:solidFill>
-                <a:latin typeface="Trebuchet MS" charset="0"/>
-              </a:rPr>
-              <a:t>4.5 </a:t>
-            </a:r>
-            <a:r>
               <a:rPr lang="es-ES" sz="1400" b="1" dirty="0">
                 <a:solidFill>
                   <a:schemeClr val="accent2"/>
                 </a:solidFill>
                 <a:latin typeface="Trebuchet MS" charset="0"/>
               </a:rPr>
-              <a:t>Transformada de Fourier bidimensional y sus propiedades</a:t>
-            </a:r>
-            <a:r>
-              <a:rPr lang="es-ES" sz="1400" b="1" dirty="0" smtClean="0">
-                <a:solidFill>
-                  <a:schemeClr val="accent2"/>
-                </a:solidFill>
-                <a:latin typeface="Trebuchet MS" charset="0"/>
-              </a:rPr>
-              <a:t/>
-            </a:r>
-            <a:br>
-              <a:rPr lang="es-ES" sz="1400" b="1" dirty="0" smtClean="0">
-                <a:solidFill>
-                  <a:schemeClr val="accent2"/>
-                </a:solidFill>
-                <a:latin typeface="Trebuchet MS" charset="0"/>
-              </a:rPr>
-            </a:br>
-            <a:r>
-              <a:rPr lang="es-ES" sz="1400" b="1" dirty="0" smtClean="0">
-                <a:solidFill>
-                  <a:schemeClr val="accent2"/>
-                </a:solidFill>
-                <a:latin typeface="Trebuchet MS" charset="0"/>
-              </a:rPr>
-              <a:t>4.6 </a:t>
-            </a:r>
-            <a:r>
-              <a:rPr lang="es-ES" sz="1400" b="1" dirty="0">
-                <a:solidFill>
-                  <a:schemeClr val="accent2"/>
-                </a:solidFill>
-                <a:latin typeface="Trebuchet MS" charset="0"/>
-              </a:rPr>
-              <a:t>Otras transformadas</a:t>
+              <a:t>4.6 Otras transformadas</a:t>
             </a:r>
           </a:p>
         </p:txBody>
@@ -10255,13 +9970,6 @@
   <p:clrMapOvr>
     <a:masterClrMapping/>
   </p:clrMapOvr>
-  <p:timing>
-    <p:tnLst>
-      <p:par>
-        <p:cTn id="1" dur="indefinite" restart="never" nodeType="tmRoot"/>
-      </p:par>
-    </p:tnLst>
-  </p:timing>
 </p:sld>
 </file>
 
@@ -10436,13 +10144,6 @@
   <p:clrMapOvr>
     <a:masterClrMapping/>
   </p:clrMapOvr>
-  <p:timing>
-    <p:tnLst>
-      <p:par>
-        <p:cTn id="1" dur="indefinite" restart="never" nodeType="tmRoot"/>
-      </p:par>
-    </p:tnLst>
-  </p:timing>
 </p:sld>
 </file>
 
@@ -10634,13 +10335,6 @@
   <p:clrMapOvr>
     <a:masterClrMapping/>
   </p:clrMapOvr>
-  <p:timing>
-    <p:tnLst>
-      <p:par>
-        <p:cTn id="1" dur="indefinite" restart="never" nodeType="tmRoot"/>
-      </p:par>
-    </p:tnLst>
-  </p:timing>
 </p:sld>
 </file>
 
@@ -10815,13 +10509,6 @@
   <p:clrMapOvr>
     <a:masterClrMapping/>
   </p:clrMapOvr>
-  <p:timing>
-    <p:tnLst>
-      <p:par>
-        <p:cTn id="1" dur="indefinite" restart="never" nodeType="tmRoot"/>
-      </p:par>
-    </p:tnLst>
-  </p:timing>
 </p:sld>
 </file>
 
@@ -11030,13 +10717,6 @@
   <p:clrMapOvr>
     <a:masterClrMapping/>
   </p:clrMapOvr>
-  <p:timing>
-    <p:tnLst>
-      <p:par>
-        <p:cTn id="1" dur="indefinite" restart="never" nodeType="tmRoot"/>
-      </p:par>
-    </p:tnLst>
-  </p:timing>
 </p:sld>
 </file>
 
@@ -11110,16 +10790,7 @@
                 </a:solidFill>
                 <a:latin typeface="Trebuchet MS" charset="0"/>
               </a:rPr>
-              <a:t>ICC / IEE</a:t>
-            </a:r>
-            <a:r>
-              <a:rPr lang="es-CL" sz="3200" b="1" dirty="0" smtClean="0">
-                <a:solidFill>
-                  <a:srgbClr val="3333CC"/>
-                </a:solidFill>
-                <a:latin typeface="Trebuchet MS" charset="0"/>
-              </a:rPr>
-              <a:t> 2714</a:t>
+              <a:t>ICC / IEE 2714</a:t>
             </a:r>
           </a:p>
           <a:p>
@@ -11192,13 +10863,6 @@
   <p:clrMapOvr>
     <a:masterClrMapping/>
   </p:clrMapOvr>
-  <p:timing>
-    <p:tnLst>
-      <p:par>
-        <p:cTn id="1" dur="indefinite" restart="never" nodeType="tmRoot"/>
-      </p:par>
-    </p:tnLst>
-  </p:timing>
 </p:sld>
 </file>
 
@@ -11294,13 +10958,6 @@
   <p:clrMapOvr>
     <a:masterClrMapping/>
   </p:clrMapOvr>
-  <p:timing>
-    <p:tnLst>
-      <p:par>
-        <p:cTn id="1" dur="indefinite" restart="never" nodeType="tmRoot"/>
-      </p:par>
-    </p:tnLst>
-  </p:timing>
 </p:sld>
 </file>
 
@@ -11365,7 +11022,7 @@
             </a:r>
           </a:p>
           <a:p>
-            <a:endParaRPr lang="es-ES" b="1" dirty="0" smtClean="0">
+            <a:endParaRPr lang="es-ES" b="1" dirty="0">
               <a:solidFill>
                 <a:schemeClr val="accent2"/>
               </a:solidFill>
@@ -11374,7 +11031,7 @@
           </a:p>
           <a:p>
             <a:r>
-              <a:rPr lang="es-CL" b="1" dirty="0" smtClean="0">
+              <a:rPr lang="es-CL" b="1" dirty="0">
                 <a:solidFill>
                   <a:schemeClr val="accent2"/>
                 </a:solidFill>
@@ -11385,7 +11042,7 @@
           </a:p>
           <a:p>
             <a:r>
-              <a:rPr lang="es-CL" b="1" dirty="0" smtClean="0">
+              <a:rPr lang="es-CL" b="1" dirty="0">
                 <a:solidFill>
                   <a:schemeClr val="accent2"/>
                 </a:solidFill>
@@ -11394,48 +11051,13 @@
               <a:t>Trabajo en Clases</a:t>
             </a:r>
             <a:r>
-              <a:rPr lang="es-CL" b="1" smtClean="0">
+              <a:rPr lang="es-CL" b="1">
                 <a:solidFill>
                   <a:schemeClr val="accent2"/>
                 </a:solidFill>
                 <a:latin typeface="Trebuchet MS" charset="0"/>
               </a:rPr>
               <a:t>	20% (incluye controles, guías de trabajo, etc)</a:t>
-            </a:r>
-            <a:endParaRPr lang="es-CL" b="1" dirty="0" smtClean="0">
-              <a:solidFill>
-                <a:schemeClr val="accent2"/>
-              </a:solidFill>
-              <a:latin typeface="Trebuchet MS" charset="0"/>
-            </a:endParaRPr>
-          </a:p>
-          <a:p>
-            <a:r>
-              <a:rPr lang="es-CL" b="1" dirty="0" smtClean="0">
-                <a:solidFill>
-                  <a:schemeClr val="accent2"/>
-                </a:solidFill>
-                <a:latin typeface="Trebuchet MS" charset="0"/>
-              </a:rPr>
-              <a:t>3 </a:t>
-            </a:r>
-            <a:r>
-              <a:rPr lang="es-CL" b="1" dirty="0">
-                <a:solidFill>
-                  <a:schemeClr val="accent2"/>
-                </a:solidFill>
-                <a:latin typeface="Trebuchet MS" charset="0"/>
-              </a:rPr>
-              <a:t>Tareas</a:t>
-            </a:r>
-            <a:r>
-              <a:rPr lang="es-CL" b="1" dirty="0" smtClean="0">
-                <a:solidFill>
-                  <a:schemeClr val="accent2"/>
-                </a:solidFill>
-                <a:latin typeface="Trebuchet MS" charset="0"/>
-              </a:rPr>
-              <a:t>			50%..................................mayor que 4.0</a:t>
             </a:r>
             <a:endParaRPr lang="es-CL" b="1" dirty="0">
               <a:solidFill>
@@ -11452,16 +11074,18 @@
                 </a:solidFill>
                 <a:latin typeface="Trebuchet MS" charset="0"/>
               </a:rPr>
-              <a:t>Proyecto</a:t>
-            </a:r>
-            <a:r>
-              <a:rPr lang="es-CL" b="1" dirty="0" smtClean="0">
-                <a:solidFill>
-                  <a:schemeClr val="accent2"/>
-                </a:solidFill>
-                <a:latin typeface="Trebuchet MS" charset="0"/>
-              </a:rPr>
-              <a:t>		30%..................................mayor que 4.0</a:t>
+              <a:t>3 Tareas			50%..................................mayor que 4.0</a:t>
+            </a:r>
+          </a:p>
+          <a:p>
+            <a:r>
+              <a:rPr lang="es-CL" b="1" dirty="0">
+                <a:solidFill>
+                  <a:schemeClr val="accent2"/>
+                </a:solidFill>
+                <a:latin typeface="Trebuchet MS" charset="0"/>
+              </a:rPr>
+              <a:t>Proyecto		30%..................................mayor que 4.0</a:t>
             </a:r>
             <a:endParaRPr lang="es-ES" b="1" dirty="0">
               <a:solidFill>
@@ -11477,13 +11101,6 @@
   <p:clrMapOvr>
     <a:masterClrMapping/>
   </p:clrMapOvr>
-  <p:timing>
-    <p:tnLst>
-      <p:par>
-        <p:cTn id="1" dur="indefinite" restart="never" nodeType="tmRoot"/>
-      </p:par>
-    </p:tnLst>
-  </p:timing>
 </p:sld>
 </file>
 
@@ -11538,7 +11155,7 @@
           <a:lstStyle/>
           <a:p>
             <a:r>
-              <a:rPr lang="es-ES" sz="3200" b="1" dirty="0" smtClean="0">
+              <a:rPr lang="es-ES" sz="3200" b="1" dirty="0">
                 <a:solidFill>
                   <a:schemeClr val="accent2"/>
                 </a:solidFill>
@@ -11548,7 +11165,7 @@
             </a:r>
           </a:p>
           <a:p>
-            <a:endParaRPr lang="es-ES" sz="3200" b="1" dirty="0" smtClean="0">
+            <a:endParaRPr lang="es-ES" sz="3200" b="1" dirty="0">
               <a:solidFill>
                 <a:schemeClr val="accent2"/>
               </a:solidFill>
@@ -11557,7 +11174,7 @@
           </a:p>
           <a:p>
             <a:r>
-              <a:rPr lang="es-ES_tradnl" sz="1600" b="1" dirty="0" err="1" smtClean="0">
+              <a:rPr lang="es-ES_tradnl" sz="1600" b="1" dirty="0" err="1">
                 <a:solidFill>
                   <a:schemeClr val="accent2"/>
                 </a:solidFill>
@@ -11566,7 +11183,7 @@
               <a:t>•</a:t>
             </a:r>
             <a:r>
-              <a:rPr lang="es-ES_tradnl" sz="1600" b="1" dirty="0" smtClean="0">
+              <a:rPr lang="es-ES_tradnl" sz="1600" b="1" dirty="0">
                 <a:solidFill>
                   <a:schemeClr val="accent2"/>
                 </a:solidFill>
@@ -11575,7 +11192,7 @@
               <a:t> R. C. </a:t>
             </a:r>
             <a:r>
-              <a:rPr lang="es-ES_tradnl" sz="1600" b="1" dirty="0" err="1" smtClean="0">
+              <a:rPr lang="es-ES_tradnl" sz="1600" b="1" dirty="0" err="1">
                 <a:solidFill>
                   <a:schemeClr val="accent2"/>
                 </a:solidFill>
@@ -11584,7 +11201,7 @@
               <a:t>Gonzalez</a:t>
             </a:r>
             <a:r>
-              <a:rPr lang="es-ES_tradnl" sz="1600" b="1" dirty="0" smtClean="0">
+              <a:rPr lang="es-ES_tradnl" sz="1600" b="1" dirty="0">
                 <a:solidFill>
                   <a:schemeClr val="accent2"/>
                 </a:solidFill>
@@ -11593,7 +11210,7 @@
               <a:t> </a:t>
             </a:r>
             <a:r>
-              <a:rPr lang="es-ES_tradnl" sz="1600" b="1" dirty="0" err="1" smtClean="0">
+              <a:rPr lang="es-ES_tradnl" sz="1600" b="1" dirty="0" err="1">
                 <a:solidFill>
                   <a:schemeClr val="accent2"/>
                 </a:solidFill>
@@ -11602,7 +11219,7 @@
               <a:t>and</a:t>
             </a:r>
             <a:r>
-              <a:rPr lang="es-ES_tradnl" sz="1600" b="1" dirty="0" smtClean="0">
+              <a:rPr lang="es-ES_tradnl" sz="1600" b="1" dirty="0">
                 <a:solidFill>
                   <a:schemeClr val="accent2"/>
                 </a:solidFill>
@@ -11611,7 +11228,7 @@
               <a:t> R. E. Woods, Digital </a:t>
             </a:r>
             <a:r>
-              <a:rPr lang="es-ES_tradnl" sz="1600" b="1" dirty="0" err="1" smtClean="0">
+              <a:rPr lang="es-ES_tradnl" sz="1600" b="1" dirty="0" err="1">
                 <a:solidFill>
                   <a:schemeClr val="accent2"/>
                 </a:solidFill>
@@ -11620,7 +11237,7 @@
               <a:t>Image</a:t>
             </a:r>
             <a:r>
-              <a:rPr lang="es-ES_tradnl" sz="1600" b="1" dirty="0" smtClean="0">
+              <a:rPr lang="es-ES_tradnl" sz="1600" b="1" dirty="0">
                 <a:solidFill>
                   <a:schemeClr val="accent2"/>
                 </a:solidFill>
@@ -11629,7 +11246,7 @@
               <a:t> </a:t>
             </a:r>
             <a:r>
-              <a:rPr lang="es-ES_tradnl" sz="1600" b="1" dirty="0" err="1" smtClean="0">
+              <a:rPr lang="es-ES_tradnl" sz="1600" b="1" dirty="0" err="1">
                 <a:solidFill>
                   <a:schemeClr val="accent2"/>
                 </a:solidFill>
@@ -11638,7 +11255,7 @@
               <a:t>Processing</a:t>
             </a:r>
             <a:r>
-              <a:rPr lang="es-ES_tradnl" sz="1600" b="1" dirty="0" smtClean="0">
+              <a:rPr lang="es-ES_tradnl" sz="1600" b="1" dirty="0">
                 <a:solidFill>
                   <a:schemeClr val="accent2"/>
                 </a:solidFill>
@@ -11647,7 +11264,7 @@
               <a:t>, </a:t>
             </a:r>
             <a:r>
-              <a:rPr lang="es-ES_tradnl" sz="1600" b="1" dirty="0" err="1" smtClean="0">
+              <a:rPr lang="es-ES_tradnl" sz="1600" b="1" dirty="0" err="1">
                 <a:solidFill>
                   <a:schemeClr val="accent2"/>
                 </a:solidFill>
@@ -11656,7 +11273,7 @@
               <a:t>third</a:t>
             </a:r>
             <a:r>
-              <a:rPr lang="es-ES_tradnl" sz="1600" b="1" dirty="0" smtClean="0">
+              <a:rPr lang="es-ES_tradnl" sz="1600" b="1" dirty="0">
                 <a:solidFill>
                   <a:schemeClr val="accent2"/>
                 </a:solidFill>
@@ -11665,7 +11282,7 @@
               <a:t> </a:t>
             </a:r>
             <a:r>
-              <a:rPr lang="es-ES_tradnl" sz="1600" b="1" dirty="0" err="1" smtClean="0">
+              <a:rPr lang="es-ES_tradnl" sz="1600" b="1" dirty="0" err="1">
                 <a:solidFill>
                   <a:schemeClr val="accent2"/>
                 </a:solidFill>
@@ -11674,7 +11291,7 @@
               <a:t>edition</a:t>
             </a:r>
             <a:r>
-              <a:rPr lang="es-ES_tradnl" sz="1600" b="1" dirty="0" smtClean="0">
+              <a:rPr lang="es-ES_tradnl" sz="1600" b="1" dirty="0">
                 <a:solidFill>
                   <a:schemeClr val="accent2"/>
                 </a:solidFill>
@@ -11685,7 +11302,7 @@
           </a:p>
           <a:p>
             <a:r>
-              <a:rPr lang="es-ES_tradnl" sz="1600" b="1" dirty="0" err="1" smtClean="0">
+              <a:rPr lang="es-ES_tradnl" sz="1600" b="1" dirty="0" err="1">
                 <a:solidFill>
                   <a:schemeClr val="accent2"/>
                 </a:solidFill>
@@ -11694,7 +11311,7 @@
               <a:t>•</a:t>
             </a:r>
             <a:r>
-              <a:rPr lang="es-ES_tradnl" sz="1600" b="1" dirty="0" smtClean="0">
+              <a:rPr lang="es-ES_tradnl" sz="1600" b="1" dirty="0">
                 <a:solidFill>
                   <a:schemeClr val="accent2"/>
                 </a:solidFill>
@@ -11703,7 +11320,7 @@
               <a:t> D. </a:t>
             </a:r>
             <a:r>
-              <a:rPr lang="es-ES_tradnl" sz="1600" b="1" dirty="0" err="1" smtClean="0">
+              <a:rPr lang="es-ES_tradnl" sz="1600" b="1" dirty="0" err="1">
                 <a:solidFill>
                   <a:schemeClr val="accent2"/>
                 </a:solidFill>
@@ -11712,7 +11329,7 @@
               <a:t>Forsyth</a:t>
             </a:r>
             <a:r>
-              <a:rPr lang="es-ES_tradnl" sz="1600" b="1" dirty="0" smtClean="0">
+              <a:rPr lang="es-ES_tradnl" sz="1600" b="1" dirty="0">
                 <a:solidFill>
                   <a:schemeClr val="accent2"/>
                 </a:solidFill>
@@ -11721,7 +11338,7 @@
               <a:t> </a:t>
             </a:r>
             <a:r>
-              <a:rPr lang="es-ES_tradnl" sz="1600" b="1" dirty="0" err="1" smtClean="0">
+              <a:rPr lang="es-ES_tradnl" sz="1600" b="1" dirty="0" err="1">
                 <a:solidFill>
                   <a:schemeClr val="accent2"/>
                 </a:solidFill>
@@ -11730,7 +11347,7 @@
               <a:t>and</a:t>
             </a:r>
             <a:r>
-              <a:rPr lang="es-ES_tradnl" sz="1600" b="1" dirty="0" smtClean="0">
+              <a:rPr lang="es-ES_tradnl" sz="1600" b="1" dirty="0">
                 <a:solidFill>
                   <a:schemeClr val="accent2"/>
                 </a:solidFill>
@@ -11739,7 +11356,7 @@
               <a:t> J. Ponce, </a:t>
             </a:r>
             <a:r>
-              <a:rPr lang="es-ES_tradnl" sz="1600" b="1" dirty="0" err="1" smtClean="0">
+              <a:rPr lang="es-ES_tradnl" sz="1600" b="1" dirty="0" err="1">
                 <a:solidFill>
                   <a:schemeClr val="accent2"/>
                 </a:solidFill>
@@ -11748,7 +11365,7 @@
               <a:t>Computer</a:t>
             </a:r>
             <a:r>
-              <a:rPr lang="es-ES_tradnl" sz="1600" b="1" dirty="0" smtClean="0">
+              <a:rPr lang="es-ES_tradnl" sz="1600" b="1" dirty="0">
                 <a:solidFill>
                   <a:schemeClr val="accent2"/>
                 </a:solidFill>
@@ -11757,7 +11374,7 @@
               <a:t> </a:t>
             </a:r>
             <a:r>
-              <a:rPr lang="es-ES_tradnl" sz="1600" b="1" dirty="0" err="1" smtClean="0">
+              <a:rPr lang="es-ES_tradnl" sz="1600" b="1" dirty="0" err="1">
                 <a:solidFill>
                   <a:schemeClr val="accent2"/>
                 </a:solidFill>
@@ -11766,7 +11383,7 @@
               <a:t>Vision</a:t>
             </a:r>
             <a:r>
-              <a:rPr lang="es-ES_tradnl" sz="1600" b="1" dirty="0" smtClean="0">
+              <a:rPr lang="es-ES_tradnl" sz="1600" b="1" dirty="0">
                 <a:solidFill>
                   <a:schemeClr val="accent2"/>
                 </a:solidFill>
@@ -11775,7 +11392,7 @@
               <a:t>: a Modern </a:t>
             </a:r>
             <a:r>
-              <a:rPr lang="es-ES_tradnl" sz="1600" b="1" dirty="0" err="1" smtClean="0">
+              <a:rPr lang="es-ES_tradnl" sz="1600" b="1" dirty="0" err="1">
                 <a:solidFill>
                   <a:schemeClr val="accent2"/>
                 </a:solidFill>
@@ -11784,7 +11401,7 @@
               <a:t>Approach</a:t>
             </a:r>
             <a:r>
-              <a:rPr lang="es-ES_tradnl" sz="1600" b="1" dirty="0" smtClean="0">
+              <a:rPr lang="es-ES_tradnl" sz="1600" b="1" dirty="0">
                 <a:solidFill>
                   <a:schemeClr val="accent2"/>
                 </a:solidFill>
@@ -11801,16 +11418,7 @@
                 </a:solidFill>
                 <a:latin typeface="Trebuchet MS" charset="0"/>
               </a:rPr>
-              <a:t>• D. </a:t>
-            </a:r>
-            <a:r>
-              <a:rPr lang="es-ES_tradnl" sz="1600" b="1" dirty="0" smtClean="0">
-                <a:solidFill>
-                  <a:schemeClr val="accent2"/>
-                </a:solidFill>
-                <a:latin typeface="Trebuchet MS" charset="0"/>
-              </a:rPr>
-              <a:t>Mery, </a:t>
+              <a:t>• D. Mery, </a:t>
             </a:r>
             <a:r>
               <a:rPr lang="es-ES_tradnl" sz="1600" b="1" dirty="0" err="1">
@@ -11831,7 +11439,7 @@
               <a:t> </a:t>
             </a:r>
             <a:r>
-              <a:rPr lang="es-ES_tradnl" sz="1600" b="1" dirty="0" err="1" smtClean="0">
+              <a:rPr lang="es-ES_tradnl" sz="1600" b="1" dirty="0" err="1">
                 <a:solidFill>
                   <a:schemeClr val="accent2"/>
                 </a:solidFill>
@@ -11840,7 +11448,7 @@
               <a:t>Vision</a:t>
             </a:r>
             <a:r>
-              <a:rPr lang="es-ES_tradnl" sz="1600" b="1" dirty="0" smtClean="0">
+              <a:rPr lang="es-ES_tradnl" sz="1600" b="1" dirty="0">
                 <a:solidFill>
                   <a:schemeClr val="accent2"/>
                 </a:solidFill>
@@ -11849,7 +11457,7 @@
               <a:t> </a:t>
             </a:r>
             <a:r>
-              <a:rPr lang="es-ES_tradnl" sz="1600" b="1" dirty="0" err="1" smtClean="0">
+              <a:rPr lang="es-ES_tradnl" sz="1600" b="1" dirty="0" err="1">
                 <a:solidFill>
                   <a:schemeClr val="accent2"/>
                 </a:solidFill>
@@ -11858,7 +11466,7 @@
               <a:t>for</a:t>
             </a:r>
             <a:r>
-              <a:rPr lang="es-ES_tradnl" sz="1600" b="1" dirty="0" smtClean="0">
+              <a:rPr lang="es-ES_tradnl" sz="1600" b="1" dirty="0">
                 <a:solidFill>
                   <a:schemeClr val="accent2"/>
                 </a:solidFill>
@@ -11867,7 +11475,7 @@
               <a:t> X-</a:t>
             </a:r>
             <a:r>
-              <a:rPr lang="es-ES_tradnl" sz="1600" b="1" dirty="0" err="1" smtClean="0">
+              <a:rPr lang="es-ES_tradnl" sz="1600" b="1" dirty="0" err="1">
                 <a:solidFill>
                   <a:schemeClr val="accent2"/>
                 </a:solidFill>
@@ -11876,7 +11484,7 @@
               <a:t>ray</a:t>
             </a:r>
             <a:r>
-              <a:rPr lang="es-ES_tradnl" sz="1600" b="1" dirty="0" smtClean="0">
+              <a:rPr lang="es-ES_tradnl" sz="1600" b="1" dirty="0">
                 <a:solidFill>
                   <a:schemeClr val="accent2"/>
                 </a:solidFill>
@@ -11885,7 +11493,7 @@
               <a:t> </a:t>
             </a:r>
             <a:r>
-              <a:rPr lang="es-ES_tradnl" sz="1600" b="1" dirty="0" err="1" smtClean="0">
+              <a:rPr lang="es-ES_tradnl" sz="1600" b="1" dirty="0" err="1">
                 <a:solidFill>
                   <a:schemeClr val="accent2"/>
                 </a:solidFill>
@@ -11894,7 +11502,7 @@
               <a:t>Testing</a:t>
             </a:r>
             <a:r>
-              <a:rPr lang="es-ES_tradnl" sz="1600" b="1" dirty="0" smtClean="0">
+              <a:rPr lang="es-ES_tradnl" sz="1600" b="1" dirty="0">
                 <a:solidFill>
                   <a:schemeClr val="accent2"/>
                 </a:solidFill>
@@ -11902,16 +11510,10 @@
               </a:rPr>
               <a:t>, 2015</a:t>
             </a:r>
-            <a:endParaRPr lang="es-ES_tradnl" sz="1600" b="1" dirty="0">
-              <a:solidFill>
-                <a:schemeClr val="accent2"/>
-              </a:solidFill>
-              <a:latin typeface="Trebuchet MS" charset="0"/>
-            </a:endParaRPr>
-          </a:p>
-          <a:p>
-            <a:r>
-              <a:rPr lang="es-ES_tradnl" sz="1600" b="1" dirty="0" smtClean="0">
+          </a:p>
+          <a:p>
+            <a:r>
+              <a:rPr lang="es-ES_tradnl" sz="1600" b="1" dirty="0">
                 <a:solidFill>
                   <a:schemeClr val="accent2"/>
                 </a:solidFill>
@@ -11920,7 +11522,7 @@
               <a:t>• W. Pratt, Digital </a:t>
             </a:r>
             <a:r>
-              <a:rPr lang="es-ES_tradnl" sz="1600" b="1" dirty="0" err="1" smtClean="0">
+              <a:rPr lang="es-ES_tradnl" sz="1600" b="1" dirty="0" err="1">
                 <a:solidFill>
                   <a:schemeClr val="accent2"/>
                 </a:solidFill>
@@ -11929,7 +11531,7 @@
               <a:t>Image</a:t>
             </a:r>
             <a:r>
-              <a:rPr lang="es-ES_tradnl" sz="1600" b="1" dirty="0" smtClean="0">
+              <a:rPr lang="es-ES_tradnl" sz="1600" b="1" dirty="0">
                 <a:solidFill>
                   <a:schemeClr val="accent2"/>
                 </a:solidFill>
@@ -11938,7 +11540,7 @@
               <a:t> </a:t>
             </a:r>
             <a:r>
-              <a:rPr lang="es-ES_tradnl" sz="1600" b="1" dirty="0" err="1" smtClean="0">
+              <a:rPr lang="es-ES_tradnl" sz="1600" b="1" dirty="0" err="1">
                 <a:solidFill>
                   <a:schemeClr val="accent2"/>
                 </a:solidFill>
@@ -11947,7 +11549,7 @@
               <a:t>Processing</a:t>
             </a:r>
             <a:r>
-              <a:rPr lang="es-ES_tradnl" sz="1600" b="1" dirty="0" smtClean="0">
+              <a:rPr lang="es-ES_tradnl" sz="1600" b="1" dirty="0">
                 <a:solidFill>
                   <a:schemeClr val="accent2"/>
                 </a:solidFill>
@@ -11956,7 +11558,7 @@
               <a:t>, John </a:t>
             </a:r>
             <a:r>
-              <a:rPr lang="es-ES_tradnl" sz="1600" b="1" dirty="0" err="1" smtClean="0">
+              <a:rPr lang="es-ES_tradnl" sz="1600" b="1" dirty="0" err="1">
                 <a:solidFill>
                   <a:schemeClr val="accent2"/>
                 </a:solidFill>
@@ -11965,7 +11567,7 @@
               <a:t>Wiley</a:t>
             </a:r>
             <a:r>
-              <a:rPr lang="es-ES_tradnl" sz="1600" b="1" dirty="0" smtClean="0">
+              <a:rPr lang="es-ES_tradnl" sz="1600" b="1" dirty="0">
                 <a:solidFill>
                   <a:schemeClr val="accent2"/>
                 </a:solidFill>
@@ -11974,7 +11576,7 @@
               <a:t> &amp; </a:t>
             </a:r>
             <a:r>
-              <a:rPr lang="es-ES_tradnl" sz="1600" b="1" dirty="0" err="1" smtClean="0">
+              <a:rPr lang="es-ES_tradnl" sz="1600" b="1" dirty="0" err="1">
                 <a:solidFill>
                   <a:schemeClr val="accent2"/>
                 </a:solidFill>
@@ -11983,7 +11585,7 @@
               <a:t>Sons</a:t>
             </a:r>
             <a:r>
-              <a:rPr lang="es-ES_tradnl" sz="1600" b="1" dirty="0" smtClean="0">
+              <a:rPr lang="es-ES_tradnl" sz="1600" b="1" dirty="0">
                 <a:solidFill>
                   <a:schemeClr val="accent2"/>
                 </a:solidFill>
@@ -11992,7 +11594,7 @@
               <a:t>, 4th </a:t>
             </a:r>
             <a:r>
-              <a:rPr lang="es-ES_tradnl" sz="1600" b="1" dirty="0" err="1" smtClean="0">
+              <a:rPr lang="es-ES_tradnl" sz="1600" b="1" dirty="0" err="1">
                 <a:solidFill>
                   <a:schemeClr val="accent2"/>
                 </a:solidFill>
@@ -12001,25 +11603,45 @@
               <a:t>edition</a:t>
             </a:r>
             <a:r>
-              <a:rPr lang="es-ES_tradnl" sz="1600" b="1" dirty="0" smtClean="0">
-                <a:solidFill>
-                  <a:schemeClr val="accent2"/>
-                </a:solidFill>
-                <a:latin typeface="Trebuchet MS" charset="0"/>
-              </a:rPr>
-              <a:t>, 2007</a:t>
-            </a:r>
-            <a:r>
               <a:rPr lang="es-ES_tradnl" sz="1600" b="1" dirty="0">
                 <a:solidFill>
                   <a:schemeClr val="accent2"/>
                 </a:solidFill>
                 <a:latin typeface="Trebuchet MS" charset="0"/>
               </a:rPr>
-              <a:t>.</a:t>
-            </a:r>
-            <a:r>
-              <a:rPr lang="es-ES_tradnl" sz="1600" b="1" dirty="0" smtClean="0">
+              <a:t>, 2007. </a:t>
+            </a:r>
+          </a:p>
+          <a:p>
+            <a:r>
+              <a:rPr lang="es-ES_tradnl" sz="1600" b="1" dirty="0" err="1">
+                <a:solidFill>
+                  <a:schemeClr val="accent2"/>
+                </a:solidFill>
+                <a:latin typeface="Trebuchet MS" charset="0"/>
+              </a:rPr>
+              <a:t>•</a:t>
+            </a:r>
+            <a:r>
+              <a:rPr lang="es-ES_tradnl" sz="1600" b="1" dirty="0">
+                <a:solidFill>
+                  <a:schemeClr val="accent2"/>
+                </a:solidFill>
+                <a:latin typeface="Trebuchet MS" charset="0"/>
+              </a:rPr>
+              <a:t> J. Russ, </a:t>
+            </a:r>
+            <a:r>
+              <a:rPr lang="es-ES_tradnl" sz="1600" b="1" dirty="0" err="1">
+                <a:solidFill>
+                  <a:schemeClr val="accent2"/>
+                </a:solidFill>
+                <a:latin typeface="Trebuchet MS" charset="0"/>
+              </a:rPr>
+              <a:t>The</a:t>
+            </a:r>
+            <a:r>
+              <a:rPr lang="es-ES_tradnl" sz="1600" b="1" dirty="0">
                 <a:solidFill>
                   <a:schemeClr val="accent2"/>
                 </a:solidFill>
@@ -12027,10 +11649,100 @@
               </a:rPr>
               <a:t> </a:t>
             </a:r>
-          </a:p>
-          <a:p>
-            <a:r>
-              <a:rPr lang="es-ES_tradnl" sz="1600" b="1" dirty="0" err="1" smtClean="0">
+            <a:r>
+              <a:rPr lang="es-ES_tradnl" sz="1600" b="1" dirty="0" err="1">
+                <a:solidFill>
+                  <a:schemeClr val="accent2"/>
+                </a:solidFill>
+                <a:latin typeface="Trebuchet MS" charset="0"/>
+              </a:rPr>
+              <a:t>Image</a:t>
+            </a:r>
+            <a:r>
+              <a:rPr lang="es-ES_tradnl" sz="1600" b="1" dirty="0">
+                <a:solidFill>
+                  <a:schemeClr val="accent2"/>
+                </a:solidFill>
+                <a:latin typeface="Trebuchet MS" charset="0"/>
+              </a:rPr>
+              <a:t> </a:t>
+            </a:r>
+            <a:r>
+              <a:rPr lang="es-ES_tradnl" sz="1600" b="1" dirty="0" err="1">
+                <a:solidFill>
+                  <a:schemeClr val="accent2"/>
+                </a:solidFill>
+                <a:latin typeface="Trebuchet MS" charset="0"/>
+              </a:rPr>
+              <a:t>Processing</a:t>
+            </a:r>
+            <a:r>
+              <a:rPr lang="es-ES_tradnl" sz="1600" b="1" dirty="0">
+                <a:solidFill>
+                  <a:schemeClr val="accent2"/>
+                </a:solidFill>
+                <a:latin typeface="Trebuchet MS" charset="0"/>
+              </a:rPr>
+              <a:t> </a:t>
+            </a:r>
+            <a:r>
+              <a:rPr lang="es-ES_tradnl" sz="1600" b="1" dirty="0" err="1">
+                <a:solidFill>
+                  <a:schemeClr val="accent2"/>
+                </a:solidFill>
+                <a:latin typeface="Trebuchet MS" charset="0"/>
+              </a:rPr>
+              <a:t>Handbook</a:t>
+            </a:r>
+            <a:r>
+              <a:rPr lang="es-ES_tradnl" sz="1600" b="1" dirty="0">
+                <a:solidFill>
+                  <a:schemeClr val="accent2"/>
+                </a:solidFill>
+                <a:latin typeface="Trebuchet MS" charset="0"/>
+              </a:rPr>
+              <a:t>, 5th </a:t>
+            </a:r>
+            <a:r>
+              <a:rPr lang="es-ES_tradnl" sz="1600" b="1" dirty="0" err="1">
+                <a:solidFill>
+                  <a:schemeClr val="accent2"/>
+                </a:solidFill>
+                <a:latin typeface="Trebuchet MS" charset="0"/>
+              </a:rPr>
+              <a:t>edition</a:t>
+            </a:r>
+            <a:r>
+              <a:rPr lang="es-ES_tradnl" sz="1600" b="1" dirty="0">
+                <a:solidFill>
+                  <a:schemeClr val="accent2"/>
+                </a:solidFill>
+                <a:latin typeface="Trebuchet MS" charset="0"/>
+              </a:rPr>
+              <a:t>, CRC </a:t>
+            </a:r>
+            <a:r>
+              <a:rPr lang="es-ES_tradnl" sz="1600" b="1" dirty="0" err="1">
+                <a:solidFill>
+                  <a:schemeClr val="accent2"/>
+                </a:solidFill>
+                <a:latin typeface="Trebuchet MS" charset="0"/>
+              </a:rPr>
+              <a:t>Press</a:t>
+            </a:r>
+            <a:r>
+              <a:rPr lang="es-ES_tradnl" sz="1600" b="1" dirty="0">
+                <a:solidFill>
+                  <a:schemeClr val="accent2"/>
+                </a:solidFill>
+                <a:latin typeface="Trebuchet MS" charset="0"/>
+              </a:rPr>
+              <a:t>, 2007. </a:t>
+            </a:r>
+          </a:p>
+          <a:p>
+            <a:r>
+              <a:rPr lang="es-ES_tradnl" sz="1600" b="1" dirty="0" err="1">
                 <a:solidFill>
                   <a:schemeClr val="accent2"/>
                 </a:solidFill>
@@ -12039,25 +11751,79 @@
               <a:t>•</a:t>
             </a:r>
             <a:r>
-              <a:rPr lang="es-ES_tradnl" sz="1600" b="1" dirty="0" smtClean="0">
-                <a:solidFill>
-                  <a:schemeClr val="accent2"/>
-                </a:solidFill>
-                <a:latin typeface="Trebuchet MS" charset="0"/>
-              </a:rPr>
-              <a:t> J. Russ, </a:t>
-            </a:r>
-            <a:r>
-              <a:rPr lang="es-ES_tradnl" sz="1600" b="1" dirty="0" err="1" smtClean="0">
-                <a:solidFill>
-                  <a:schemeClr val="accent2"/>
-                </a:solidFill>
-                <a:latin typeface="Trebuchet MS" charset="0"/>
-              </a:rPr>
-              <a:t>The</a:t>
-            </a:r>
-            <a:r>
-              <a:rPr lang="es-ES_tradnl" sz="1600" b="1" dirty="0" smtClean="0">
+              <a:rPr lang="es-ES_tradnl" sz="1600" b="1" dirty="0">
+                <a:solidFill>
+                  <a:schemeClr val="accent2"/>
+                </a:solidFill>
+                <a:latin typeface="Trebuchet MS" charset="0"/>
+              </a:rPr>
+              <a:t> C. Solomon </a:t>
+            </a:r>
+            <a:r>
+              <a:rPr lang="es-ES_tradnl" sz="1600" b="1" dirty="0" err="1">
+                <a:solidFill>
+                  <a:schemeClr val="accent2"/>
+                </a:solidFill>
+                <a:latin typeface="Trebuchet MS" charset="0"/>
+              </a:rPr>
+              <a:t>and</a:t>
+            </a:r>
+            <a:r>
+              <a:rPr lang="es-ES_tradnl" sz="1600" b="1" dirty="0">
+                <a:solidFill>
+                  <a:schemeClr val="accent2"/>
+                </a:solidFill>
+                <a:latin typeface="Trebuchet MS" charset="0"/>
+              </a:rPr>
+              <a:t> T. </a:t>
+            </a:r>
+            <a:r>
+              <a:rPr lang="es-ES_tradnl" sz="1600" b="1" dirty="0" err="1">
+                <a:solidFill>
+                  <a:schemeClr val="accent2"/>
+                </a:solidFill>
+                <a:latin typeface="Trebuchet MS" charset="0"/>
+              </a:rPr>
+              <a:t>Breckon</a:t>
+            </a:r>
+            <a:r>
+              <a:rPr lang="es-ES_tradnl" sz="1600" b="1" dirty="0">
+                <a:solidFill>
+                  <a:schemeClr val="accent2"/>
+                </a:solidFill>
+                <a:latin typeface="Trebuchet MS" charset="0"/>
+              </a:rPr>
+              <a:t>, Fundamentals </a:t>
+            </a:r>
+            <a:r>
+              <a:rPr lang="es-ES_tradnl" sz="1600" b="1" dirty="0" err="1">
+                <a:solidFill>
+                  <a:schemeClr val="accent2"/>
+                </a:solidFill>
+                <a:latin typeface="Trebuchet MS" charset="0"/>
+              </a:rPr>
+              <a:t>of</a:t>
+            </a:r>
+            <a:r>
+              <a:rPr lang="es-ES_tradnl" sz="1600" b="1" dirty="0">
+                <a:solidFill>
+                  <a:schemeClr val="accent2"/>
+                </a:solidFill>
+                <a:latin typeface="Trebuchet MS" charset="0"/>
+              </a:rPr>
+              <a:t> Digital </a:t>
+            </a:r>
+            <a:r>
+              <a:rPr lang="es-ES_tradnl" sz="1600" b="1" dirty="0" err="1">
+                <a:solidFill>
+                  <a:schemeClr val="accent2"/>
+                </a:solidFill>
+                <a:latin typeface="Trebuchet MS" charset="0"/>
+              </a:rPr>
+              <a:t>Image</a:t>
+            </a:r>
+            <a:r>
+              <a:rPr lang="es-ES_tradnl" sz="1600" b="1" dirty="0">
                 <a:solidFill>
                   <a:schemeClr val="accent2"/>
                 </a:solidFill>
@@ -12066,7 +11832,315 @@
               <a:t> </a:t>
             </a:r>
             <a:r>
-              <a:rPr lang="es-ES_tradnl" sz="1600" b="1" dirty="0" err="1" smtClean="0">
+              <a:rPr lang="es-ES_tradnl" sz="1600" b="1" dirty="0" err="1">
+                <a:solidFill>
+                  <a:schemeClr val="accent2"/>
+                </a:solidFill>
+                <a:latin typeface="Trebuchet MS" charset="0"/>
+              </a:rPr>
+              <a:t>Processing</a:t>
+            </a:r>
+            <a:r>
+              <a:rPr lang="es-ES_tradnl" sz="1600" b="1" dirty="0">
+                <a:solidFill>
+                  <a:schemeClr val="accent2"/>
+                </a:solidFill>
+                <a:latin typeface="Trebuchet MS" charset="0"/>
+              </a:rPr>
+              <a:t>: A </a:t>
+            </a:r>
+            <a:r>
+              <a:rPr lang="es-ES_tradnl" sz="1600" b="1" dirty="0" err="1">
+                <a:solidFill>
+                  <a:schemeClr val="accent2"/>
+                </a:solidFill>
+                <a:latin typeface="Trebuchet MS" charset="0"/>
+              </a:rPr>
+              <a:t>practical</a:t>
+            </a:r>
+            <a:r>
+              <a:rPr lang="es-ES_tradnl" sz="1600" b="1" dirty="0">
+                <a:solidFill>
+                  <a:schemeClr val="accent2"/>
+                </a:solidFill>
+                <a:latin typeface="Trebuchet MS" charset="0"/>
+              </a:rPr>
+              <a:t> </a:t>
+            </a:r>
+            <a:r>
+              <a:rPr lang="es-ES_tradnl" sz="1600" b="1" dirty="0" err="1">
+                <a:solidFill>
+                  <a:schemeClr val="accent2"/>
+                </a:solidFill>
+                <a:latin typeface="Trebuchet MS" charset="0"/>
+              </a:rPr>
+              <a:t>approach</a:t>
+            </a:r>
+            <a:r>
+              <a:rPr lang="es-ES_tradnl" sz="1600" b="1" dirty="0">
+                <a:solidFill>
+                  <a:schemeClr val="accent2"/>
+                </a:solidFill>
+                <a:latin typeface="Trebuchet MS" charset="0"/>
+              </a:rPr>
+              <a:t> </a:t>
+            </a:r>
+            <a:r>
+              <a:rPr lang="es-ES_tradnl" sz="1600" b="1" dirty="0" err="1">
+                <a:solidFill>
+                  <a:schemeClr val="accent2"/>
+                </a:solidFill>
+                <a:latin typeface="Trebuchet MS" charset="0"/>
+              </a:rPr>
+              <a:t>with</a:t>
+            </a:r>
+            <a:r>
+              <a:rPr lang="es-ES_tradnl" sz="1600" b="1" dirty="0">
+                <a:solidFill>
+                  <a:schemeClr val="accent2"/>
+                </a:solidFill>
+                <a:latin typeface="Trebuchet MS" charset="0"/>
+              </a:rPr>
+              <a:t> </a:t>
+            </a:r>
+            <a:r>
+              <a:rPr lang="es-ES_tradnl" sz="1600" b="1" dirty="0" err="1">
+                <a:solidFill>
+                  <a:schemeClr val="accent2"/>
+                </a:solidFill>
+                <a:latin typeface="Trebuchet MS" charset="0"/>
+              </a:rPr>
+              <a:t>examples</a:t>
+            </a:r>
+            <a:r>
+              <a:rPr lang="es-ES_tradnl" sz="1600" b="1" dirty="0">
+                <a:solidFill>
+                  <a:schemeClr val="accent2"/>
+                </a:solidFill>
+                <a:latin typeface="Trebuchet MS" charset="0"/>
+              </a:rPr>
+              <a:t> in </a:t>
+            </a:r>
+            <a:r>
+              <a:rPr lang="es-ES_tradnl" sz="1600" b="1" dirty="0" err="1">
+                <a:solidFill>
+                  <a:schemeClr val="accent2"/>
+                </a:solidFill>
+                <a:latin typeface="Trebuchet MS" charset="0"/>
+              </a:rPr>
+              <a:t>Matlab</a:t>
+            </a:r>
+            <a:r>
+              <a:rPr lang="es-ES_tradnl" sz="1600" b="1" dirty="0">
+                <a:solidFill>
+                  <a:schemeClr val="accent2"/>
+                </a:solidFill>
+                <a:latin typeface="Trebuchet MS" charset="0"/>
+              </a:rPr>
+              <a:t>, </a:t>
+            </a:r>
+            <a:r>
+              <a:rPr lang="es-ES_tradnl" sz="1600" b="1" dirty="0" err="1">
+                <a:solidFill>
+                  <a:schemeClr val="accent2"/>
+                </a:solidFill>
+                <a:latin typeface="Trebuchet MS" charset="0"/>
+              </a:rPr>
+              <a:t>Wiley</a:t>
+            </a:r>
+            <a:r>
+              <a:rPr lang="es-ES_tradnl" sz="1600" b="1" dirty="0">
+                <a:solidFill>
+                  <a:schemeClr val="accent2"/>
+                </a:solidFill>
+                <a:latin typeface="Trebuchet MS" charset="0"/>
+              </a:rPr>
+              <a:t>-</a:t>
+            </a:r>
+            <a:r>
+              <a:rPr lang="es-ES_tradnl" sz="1600" b="1" dirty="0" err="1">
+                <a:solidFill>
+                  <a:schemeClr val="accent2"/>
+                </a:solidFill>
+                <a:latin typeface="Trebuchet MS" charset="0"/>
+              </a:rPr>
+              <a:t>Blackwell</a:t>
+            </a:r>
+            <a:r>
+              <a:rPr lang="es-ES_tradnl" sz="1600" b="1" dirty="0">
+                <a:solidFill>
+                  <a:schemeClr val="accent2"/>
+                </a:solidFill>
+                <a:latin typeface="Trebuchet MS" charset="0"/>
+              </a:rPr>
+              <a:t>, 2011. </a:t>
+            </a:r>
+          </a:p>
+          <a:p>
+            <a:r>
+              <a:rPr lang="es-ES_tradnl" sz="1600" b="1" dirty="0" err="1">
+                <a:solidFill>
+                  <a:schemeClr val="accent2"/>
+                </a:solidFill>
+                <a:latin typeface="Trebuchet MS" charset="0"/>
+              </a:rPr>
+              <a:t>•</a:t>
+            </a:r>
+            <a:r>
+              <a:rPr lang="es-ES_tradnl" sz="1600" b="1" dirty="0">
+                <a:solidFill>
+                  <a:schemeClr val="accent2"/>
+                </a:solidFill>
+                <a:latin typeface="Trebuchet MS" charset="0"/>
+              </a:rPr>
+              <a:t> Artículos seleccionados de las revistas: IEEE </a:t>
+            </a:r>
+            <a:r>
+              <a:rPr lang="es-ES_tradnl" sz="1600" b="1" dirty="0" err="1">
+                <a:solidFill>
+                  <a:schemeClr val="accent2"/>
+                </a:solidFill>
+                <a:latin typeface="Trebuchet MS" charset="0"/>
+              </a:rPr>
+              <a:t>Trans</a:t>
+            </a:r>
+            <a:r>
+              <a:rPr lang="es-ES_tradnl" sz="1600" b="1" dirty="0">
+                <a:solidFill>
+                  <a:schemeClr val="accent2"/>
+                </a:solidFill>
+                <a:latin typeface="Trebuchet MS" charset="0"/>
+              </a:rPr>
+              <a:t>. </a:t>
+            </a:r>
+            <a:r>
+              <a:rPr lang="es-ES_tradnl" sz="1600" b="1" dirty="0" err="1">
+                <a:solidFill>
+                  <a:schemeClr val="accent2"/>
+                </a:solidFill>
+                <a:latin typeface="Trebuchet MS" charset="0"/>
+              </a:rPr>
+              <a:t>Pattern</a:t>
+            </a:r>
+            <a:r>
+              <a:rPr lang="es-ES_tradnl" sz="1600" b="1" dirty="0">
+                <a:solidFill>
+                  <a:schemeClr val="accent2"/>
+                </a:solidFill>
+                <a:latin typeface="Trebuchet MS" charset="0"/>
+              </a:rPr>
+              <a:t> </a:t>
+            </a:r>
+            <a:r>
+              <a:rPr lang="es-ES_tradnl" sz="1600" b="1" dirty="0" err="1">
+                <a:solidFill>
+                  <a:schemeClr val="accent2"/>
+                </a:solidFill>
+                <a:latin typeface="Trebuchet MS" charset="0"/>
+              </a:rPr>
+              <a:t>Analysis</a:t>
+            </a:r>
+            <a:r>
+              <a:rPr lang="es-ES_tradnl" sz="1600" b="1" dirty="0">
+                <a:solidFill>
+                  <a:schemeClr val="accent2"/>
+                </a:solidFill>
+                <a:latin typeface="Trebuchet MS" charset="0"/>
+              </a:rPr>
+              <a:t> </a:t>
+            </a:r>
+            <a:r>
+              <a:rPr lang="es-ES_tradnl" sz="1600" b="1" dirty="0" err="1">
+                <a:solidFill>
+                  <a:schemeClr val="accent2"/>
+                </a:solidFill>
+                <a:latin typeface="Trebuchet MS" charset="0"/>
+              </a:rPr>
+              <a:t>and</a:t>
+            </a:r>
+            <a:r>
+              <a:rPr lang="es-ES_tradnl" sz="1600" b="1" dirty="0">
+                <a:solidFill>
+                  <a:schemeClr val="accent2"/>
+                </a:solidFill>
+                <a:latin typeface="Trebuchet MS" charset="0"/>
+              </a:rPr>
+              <a:t> </a:t>
+            </a:r>
+            <a:r>
+              <a:rPr lang="es-ES_tradnl" sz="1600" b="1" dirty="0" err="1">
+                <a:solidFill>
+                  <a:schemeClr val="accent2"/>
+                </a:solidFill>
+                <a:latin typeface="Trebuchet MS" charset="0"/>
+              </a:rPr>
+              <a:t>Machine</a:t>
+            </a:r>
+            <a:r>
+              <a:rPr lang="es-ES_tradnl" sz="1600" b="1" dirty="0">
+                <a:solidFill>
+                  <a:schemeClr val="accent2"/>
+                </a:solidFill>
+                <a:latin typeface="Trebuchet MS" charset="0"/>
+              </a:rPr>
+              <a:t> </a:t>
+            </a:r>
+            <a:r>
+              <a:rPr lang="es-ES_tradnl" sz="1600" b="1" dirty="0" err="1">
+                <a:solidFill>
+                  <a:schemeClr val="accent2"/>
+                </a:solidFill>
+                <a:latin typeface="Trebuchet MS" charset="0"/>
+              </a:rPr>
+              <a:t>Intelligence</a:t>
+            </a:r>
+            <a:r>
+              <a:rPr lang="es-ES_tradnl" sz="1600" b="1" dirty="0">
+                <a:solidFill>
+                  <a:schemeClr val="accent2"/>
+                </a:solidFill>
+                <a:latin typeface="Trebuchet MS" charset="0"/>
+              </a:rPr>
+              <a:t>, IEEE </a:t>
+            </a:r>
+            <a:r>
+              <a:rPr lang="es-ES_tradnl" sz="1600" b="1" dirty="0" err="1">
+                <a:solidFill>
+                  <a:schemeClr val="accent2"/>
+                </a:solidFill>
+                <a:latin typeface="Trebuchet MS" charset="0"/>
+              </a:rPr>
+              <a:t>Trans</a:t>
+            </a:r>
+            <a:r>
+              <a:rPr lang="es-ES_tradnl" sz="1600" b="1" dirty="0">
+                <a:solidFill>
+                  <a:schemeClr val="accent2"/>
+                </a:solidFill>
+                <a:latin typeface="Trebuchet MS" charset="0"/>
+              </a:rPr>
+              <a:t>. </a:t>
+            </a:r>
+            <a:r>
+              <a:rPr lang="es-ES_tradnl" sz="1600" b="1" dirty="0" err="1">
+                <a:solidFill>
+                  <a:schemeClr val="accent2"/>
+                </a:solidFill>
+                <a:latin typeface="Trebuchet MS" charset="0"/>
+              </a:rPr>
+              <a:t>on</a:t>
+            </a:r>
+            <a:r>
+              <a:rPr lang="es-ES_tradnl" sz="1600" b="1" dirty="0">
+                <a:solidFill>
+                  <a:schemeClr val="accent2"/>
+                </a:solidFill>
+                <a:latin typeface="Trebuchet MS" charset="0"/>
+              </a:rPr>
+              <a:t> </a:t>
+            </a:r>
+            <a:r>
+              <a:rPr lang="es-ES_tradnl" sz="1600" b="1" dirty="0" err="1">
                 <a:solidFill>
                   <a:schemeClr val="accent2"/>
                 </a:solidFill>
@@ -12075,7 +12149,7 @@
               <a:t>Image</a:t>
             </a:r>
             <a:r>
-              <a:rPr lang="es-ES_tradnl" sz="1600" b="1" dirty="0" smtClean="0">
+              <a:rPr lang="es-ES_tradnl" sz="1600" b="1" dirty="0">
                 <a:solidFill>
                   <a:schemeClr val="accent2"/>
                 </a:solidFill>
@@ -12084,7 +12158,7 @@
               <a:t> </a:t>
             </a:r>
             <a:r>
-              <a:rPr lang="es-ES_tradnl" sz="1600" b="1" dirty="0" err="1" smtClean="0">
+              <a:rPr lang="es-ES_tradnl" sz="1600" b="1" dirty="0" err="1">
                 <a:solidFill>
                   <a:schemeClr val="accent2"/>
                 </a:solidFill>
@@ -12093,7 +12167,25 @@
               <a:t>Processing</a:t>
             </a:r>
             <a:r>
-              <a:rPr lang="es-ES_tradnl" sz="1600" b="1" dirty="0" smtClean="0">
+              <a:rPr lang="es-ES_tradnl" sz="1600" b="1" dirty="0">
+                <a:solidFill>
+                  <a:schemeClr val="accent2"/>
+                </a:solidFill>
+                <a:latin typeface="Trebuchet MS" charset="0"/>
+              </a:rPr>
+              <a:t> así como de los </a:t>
+            </a:r>
+            <a:r>
+              <a:rPr lang="es-ES_tradnl" sz="1600" b="1" dirty="0" err="1">
+                <a:solidFill>
+                  <a:schemeClr val="accent2"/>
+                </a:solidFill>
+                <a:latin typeface="Trebuchet MS" charset="0"/>
+              </a:rPr>
+              <a:t>Proceedings</a:t>
+            </a:r>
+            <a:r>
+              <a:rPr lang="es-ES_tradnl" sz="1600" b="1" dirty="0">
                 <a:solidFill>
                   <a:schemeClr val="accent2"/>
                 </a:solidFill>
@@ -12102,81 +12194,133 @@
               <a:t> </a:t>
             </a:r>
             <a:r>
-              <a:rPr lang="es-ES_tradnl" sz="1600" b="1" dirty="0" err="1" smtClean="0">
-                <a:solidFill>
-                  <a:schemeClr val="accent2"/>
-                </a:solidFill>
-                <a:latin typeface="Trebuchet MS" charset="0"/>
-              </a:rPr>
-              <a:t>Handbook</a:t>
-            </a:r>
-            <a:r>
-              <a:rPr lang="es-ES_tradnl" sz="1600" b="1" dirty="0" smtClean="0">
-                <a:solidFill>
-                  <a:schemeClr val="accent2"/>
-                </a:solidFill>
-                <a:latin typeface="Trebuchet MS" charset="0"/>
-              </a:rPr>
-              <a:t>, 5th </a:t>
-            </a:r>
-            <a:r>
-              <a:rPr lang="es-ES_tradnl" sz="1600" b="1" dirty="0" err="1" smtClean="0">
-                <a:solidFill>
-                  <a:schemeClr val="accent2"/>
-                </a:solidFill>
-                <a:latin typeface="Trebuchet MS" charset="0"/>
-              </a:rPr>
-              <a:t>edition</a:t>
-            </a:r>
-            <a:r>
-              <a:rPr lang="es-ES_tradnl" sz="1600" b="1" dirty="0" smtClean="0">
-                <a:solidFill>
-                  <a:schemeClr val="accent2"/>
-                </a:solidFill>
-                <a:latin typeface="Trebuchet MS" charset="0"/>
-              </a:rPr>
-              <a:t>, CRC </a:t>
-            </a:r>
-            <a:r>
-              <a:rPr lang="es-ES_tradnl" sz="1600" b="1" dirty="0" err="1" smtClean="0">
-                <a:solidFill>
-                  <a:schemeClr val="accent2"/>
-                </a:solidFill>
-                <a:latin typeface="Trebuchet MS" charset="0"/>
-              </a:rPr>
-              <a:t>Press</a:t>
-            </a:r>
-            <a:r>
-              <a:rPr lang="es-ES_tradnl" sz="1600" b="1" dirty="0" smtClean="0">
-                <a:solidFill>
-                  <a:schemeClr val="accent2"/>
-                </a:solidFill>
-                <a:latin typeface="Trebuchet MS" charset="0"/>
-              </a:rPr>
-              <a:t>, 2007. </a:t>
-            </a:r>
-          </a:p>
-          <a:p>
-            <a:r>
-              <a:rPr lang="es-ES_tradnl" sz="1600" b="1" dirty="0" err="1" smtClean="0">
-                <a:solidFill>
-                  <a:schemeClr val="accent2"/>
-                </a:solidFill>
-                <a:latin typeface="Trebuchet MS" charset="0"/>
-              </a:rPr>
-              <a:t>•</a:t>
-            </a:r>
-            <a:r>
-              <a:rPr lang="es-ES_tradnl" sz="1600" b="1" dirty="0" smtClean="0">
-                <a:solidFill>
-                  <a:schemeClr val="accent2"/>
-                </a:solidFill>
-                <a:latin typeface="Trebuchet MS" charset="0"/>
-              </a:rPr>
-              <a:t> C. Solomon </a:t>
-            </a:r>
-            <a:r>
-              <a:rPr lang="es-ES_tradnl" sz="1600" b="1" dirty="0" err="1" smtClean="0">
+              <a:rPr lang="es-ES_tradnl" sz="1600" b="1" dirty="0" err="1">
+                <a:solidFill>
+                  <a:schemeClr val="accent2"/>
+                </a:solidFill>
+                <a:latin typeface="Trebuchet MS" charset="0"/>
+              </a:rPr>
+              <a:t>of</a:t>
+            </a:r>
+            <a:r>
+              <a:rPr lang="es-ES_tradnl" sz="1600" b="1" dirty="0">
+                <a:solidFill>
+                  <a:schemeClr val="accent2"/>
+                </a:solidFill>
+                <a:latin typeface="Trebuchet MS" charset="0"/>
+              </a:rPr>
+              <a:t> International </a:t>
+            </a:r>
+            <a:r>
+              <a:rPr lang="es-ES_tradnl" sz="1600" b="1" dirty="0" err="1">
+                <a:solidFill>
+                  <a:schemeClr val="accent2"/>
+                </a:solidFill>
+                <a:latin typeface="Trebuchet MS" charset="0"/>
+              </a:rPr>
+              <a:t>Conferences</a:t>
+            </a:r>
+            <a:r>
+              <a:rPr lang="es-ES_tradnl" sz="1600" b="1" dirty="0">
+                <a:solidFill>
+                  <a:schemeClr val="accent2"/>
+                </a:solidFill>
+                <a:latin typeface="Trebuchet MS" charset="0"/>
+              </a:rPr>
+              <a:t> </a:t>
+            </a:r>
+            <a:r>
+              <a:rPr lang="es-ES_tradnl" sz="1600" b="1" dirty="0" err="1">
+                <a:solidFill>
+                  <a:schemeClr val="accent2"/>
+                </a:solidFill>
+                <a:latin typeface="Trebuchet MS" charset="0"/>
+              </a:rPr>
+              <a:t>on</a:t>
+            </a:r>
+            <a:r>
+              <a:rPr lang="es-ES_tradnl" sz="1600" b="1" dirty="0">
+                <a:solidFill>
+                  <a:schemeClr val="accent2"/>
+                </a:solidFill>
+                <a:latin typeface="Trebuchet MS" charset="0"/>
+              </a:rPr>
+              <a:t> </a:t>
+            </a:r>
+            <a:r>
+              <a:rPr lang="es-ES_tradnl" sz="1600" b="1" dirty="0" err="1">
+                <a:solidFill>
+                  <a:schemeClr val="accent2"/>
+                </a:solidFill>
+                <a:latin typeface="Trebuchet MS" charset="0"/>
+              </a:rPr>
+              <a:t>Image</a:t>
+            </a:r>
+            <a:r>
+              <a:rPr lang="es-ES_tradnl" sz="1600" b="1" dirty="0">
+                <a:solidFill>
+                  <a:schemeClr val="accent2"/>
+                </a:solidFill>
+                <a:latin typeface="Trebuchet MS" charset="0"/>
+              </a:rPr>
+              <a:t> </a:t>
+            </a:r>
+            <a:r>
+              <a:rPr lang="es-ES_tradnl" sz="1600" b="1" dirty="0" err="1">
+                <a:solidFill>
+                  <a:schemeClr val="accent2"/>
+                </a:solidFill>
+                <a:latin typeface="Trebuchet MS" charset="0"/>
+              </a:rPr>
+              <a:t>Processing</a:t>
+            </a:r>
+            <a:r>
+              <a:rPr lang="es-ES_tradnl" sz="1600" b="1" dirty="0">
+                <a:solidFill>
+                  <a:schemeClr val="accent2"/>
+                </a:solidFill>
+                <a:latin typeface="Trebuchet MS" charset="0"/>
+              </a:rPr>
+              <a:t>, </a:t>
+            </a:r>
+            <a:r>
+              <a:rPr lang="es-ES_tradnl" sz="1600" b="1" dirty="0" err="1">
+                <a:solidFill>
+                  <a:schemeClr val="accent2"/>
+                </a:solidFill>
+                <a:latin typeface="Trebuchet MS" charset="0"/>
+              </a:rPr>
+              <a:t>Computer</a:t>
+            </a:r>
+            <a:r>
+              <a:rPr lang="es-ES_tradnl" sz="1600" b="1" dirty="0">
+                <a:solidFill>
+                  <a:schemeClr val="accent2"/>
+                </a:solidFill>
+                <a:latin typeface="Trebuchet MS" charset="0"/>
+              </a:rPr>
+              <a:t> </a:t>
+            </a:r>
+            <a:r>
+              <a:rPr lang="es-ES_tradnl" sz="1600" b="1" dirty="0" err="1">
+                <a:solidFill>
+                  <a:schemeClr val="accent2"/>
+                </a:solidFill>
+                <a:latin typeface="Trebuchet MS" charset="0"/>
+              </a:rPr>
+              <a:t>Vision</a:t>
+            </a:r>
+            <a:r>
+              <a:rPr lang="es-ES_tradnl" sz="1600" b="1" dirty="0">
+                <a:solidFill>
+                  <a:schemeClr val="accent2"/>
+                </a:solidFill>
+                <a:latin typeface="Trebuchet MS" charset="0"/>
+              </a:rPr>
+              <a:t> </a:t>
+            </a:r>
+            <a:r>
+              <a:rPr lang="es-ES_tradnl" sz="1600" b="1" dirty="0" err="1">
                 <a:solidFill>
                   <a:schemeClr val="accent2"/>
                 </a:solidFill>
@@ -12185,61 +12329,7 @@
               <a:t>and</a:t>
             </a:r>
             <a:r>
-              <a:rPr lang="es-ES_tradnl" sz="1600" b="1" dirty="0" smtClean="0">
-                <a:solidFill>
-                  <a:schemeClr val="accent2"/>
-                </a:solidFill>
-                <a:latin typeface="Trebuchet MS" charset="0"/>
-              </a:rPr>
-              <a:t> T. </a:t>
-            </a:r>
-            <a:r>
-              <a:rPr lang="es-ES_tradnl" sz="1600" b="1" dirty="0" err="1" smtClean="0">
-                <a:solidFill>
-                  <a:schemeClr val="accent2"/>
-                </a:solidFill>
-                <a:latin typeface="Trebuchet MS" charset="0"/>
-              </a:rPr>
-              <a:t>Breckon</a:t>
-            </a:r>
-            <a:r>
-              <a:rPr lang="es-ES_tradnl" sz="1600" b="1" dirty="0" smtClean="0">
-                <a:solidFill>
-                  <a:schemeClr val="accent2"/>
-                </a:solidFill>
-                <a:latin typeface="Trebuchet MS" charset="0"/>
-              </a:rPr>
-              <a:t>, Fundamentals </a:t>
-            </a:r>
-            <a:r>
-              <a:rPr lang="es-ES_tradnl" sz="1600" b="1" dirty="0" err="1" smtClean="0">
-                <a:solidFill>
-                  <a:schemeClr val="accent2"/>
-                </a:solidFill>
-                <a:latin typeface="Trebuchet MS" charset="0"/>
-              </a:rPr>
-              <a:t>of</a:t>
-            </a:r>
-            <a:r>
-              <a:rPr lang="es-ES_tradnl" sz="1600" b="1" dirty="0" smtClean="0">
-                <a:solidFill>
-                  <a:schemeClr val="accent2"/>
-                </a:solidFill>
-                <a:latin typeface="Trebuchet MS" charset="0"/>
-              </a:rPr>
-              <a:t> Digital </a:t>
-            </a:r>
-            <a:r>
-              <a:rPr lang="es-ES_tradnl" sz="1600" b="1" dirty="0" err="1" smtClean="0">
-                <a:solidFill>
-                  <a:schemeClr val="accent2"/>
-                </a:solidFill>
-                <a:latin typeface="Trebuchet MS" charset="0"/>
-              </a:rPr>
-              <a:t>Image</a:t>
-            </a:r>
-            <a:r>
-              <a:rPr lang="es-ES_tradnl" sz="1600" b="1" dirty="0" smtClean="0">
+              <a:rPr lang="es-ES_tradnl" sz="1600" b="1" dirty="0">
                 <a:solidFill>
                   <a:schemeClr val="accent2"/>
                 </a:solidFill>
@@ -12248,34 +12338,16 @@
               <a:t> </a:t>
             </a:r>
             <a:r>
-              <a:rPr lang="es-ES_tradnl" sz="1600" b="1" dirty="0" err="1" smtClean="0">
-                <a:solidFill>
-                  <a:schemeClr val="accent2"/>
-                </a:solidFill>
-                <a:latin typeface="Trebuchet MS" charset="0"/>
-              </a:rPr>
-              <a:t>Processing</a:t>
-            </a:r>
-            <a:r>
-              <a:rPr lang="es-ES_tradnl" sz="1600" b="1" dirty="0" smtClean="0">
-                <a:solidFill>
-                  <a:schemeClr val="accent2"/>
-                </a:solidFill>
-                <a:latin typeface="Trebuchet MS" charset="0"/>
-              </a:rPr>
-              <a:t>: A </a:t>
-            </a:r>
-            <a:r>
-              <a:rPr lang="es-ES_tradnl" sz="1600" b="1" dirty="0" err="1" smtClean="0">
-                <a:solidFill>
-                  <a:schemeClr val="accent2"/>
-                </a:solidFill>
-                <a:latin typeface="Trebuchet MS" charset="0"/>
-              </a:rPr>
-              <a:t>practical</a:t>
-            </a:r>
-            <a:r>
-              <a:rPr lang="es-ES_tradnl" sz="1600" b="1" dirty="0" smtClean="0">
+              <a:rPr lang="es-ES_tradnl" sz="1600" b="1" dirty="0" err="1">
+                <a:solidFill>
+                  <a:schemeClr val="accent2"/>
+                </a:solidFill>
+                <a:latin typeface="Trebuchet MS" charset="0"/>
+              </a:rPr>
+              <a:t>Pattern</a:t>
+            </a:r>
+            <a:r>
+              <a:rPr lang="es-ES_tradnl" sz="1600" b="1" dirty="0">
                 <a:solidFill>
                   <a:schemeClr val="accent2"/>
                 </a:solidFill>
@@ -12284,495 +12356,7 @@
               <a:t> </a:t>
             </a:r>
             <a:r>
-              <a:rPr lang="es-ES_tradnl" sz="1600" b="1" dirty="0" err="1" smtClean="0">
-                <a:solidFill>
-                  <a:schemeClr val="accent2"/>
-                </a:solidFill>
-                <a:latin typeface="Trebuchet MS" charset="0"/>
-              </a:rPr>
-              <a:t>approach</a:t>
-            </a:r>
-            <a:r>
-              <a:rPr lang="es-ES_tradnl" sz="1600" b="1" dirty="0" smtClean="0">
-                <a:solidFill>
-                  <a:schemeClr val="accent2"/>
-                </a:solidFill>
-                <a:latin typeface="Trebuchet MS" charset="0"/>
-              </a:rPr>
-              <a:t> </a:t>
-            </a:r>
-            <a:r>
-              <a:rPr lang="es-ES_tradnl" sz="1600" b="1" dirty="0" err="1" smtClean="0">
-                <a:solidFill>
-                  <a:schemeClr val="accent2"/>
-                </a:solidFill>
-                <a:latin typeface="Trebuchet MS" charset="0"/>
-              </a:rPr>
-              <a:t>with</a:t>
-            </a:r>
-            <a:r>
-              <a:rPr lang="es-ES_tradnl" sz="1600" b="1" dirty="0" smtClean="0">
-                <a:solidFill>
-                  <a:schemeClr val="accent2"/>
-                </a:solidFill>
-                <a:latin typeface="Trebuchet MS" charset="0"/>
-              </a:rPr>
-              <a:t> </a:t>
-            </a:r>
-            <a:r>
-              <a:rPr lang="es-ES_tradnl" sz="1600" b="1" dirty="0" err="1" smtClean="0">
-                <a:solidFill>
-                  <a:schemeClr val="accent2"/>
-                </a:solidFill>
-                <a:latin typeface="Trebuchet MS" charset="0"/>
-              </a:rPr>
-              <a:t>examples</a:t>
-            </a:r>
-            <a:r>
-              <a:rPr lang="es-ES_tradnl" sz="1600" b="1" dirty="0" smtClean="0">
-                <a:solidFill>
-                  <a:schemeClr val="accent2"/>
-                </a:solidFill>
-                <a:latin typeface="Trebuchet MS" charset="0"/>
-              </a:rPr>
-              <a:t> in </a:t>
-            </a:r>
-            <a:r>
-              <a:rPr lang="es-ES_tradnl" sz="1600" b="1" dirty="0" err="1" smtClean="0">
-                <a:solidFill>
-                  <a:schemeClr val="accent2"/>
-                </a:solidFill>
-                <a:latin typeface="Trebuchet MS" charset="0"/>
-              </a:rPr>
-              <a:t>Matlab</a:t>
-            </a:r>
-            <a:r>
-              <a:rPr lang="es-ES_tradnl" sz="1600" b="1" dirty="0" smtClean="0">
-                <a:solidFill>
-                  <a:schemeClr val="accent2"/>
-                </a:solidFill>
-                <a:latin typeface="Trebuchet MS" charset="0"/>
-              </a:rPr>
-              <a:t>, </a:t>
-            </a:r>
-            <a:r>
-              <a:rPr lang="es-ES_tradnl" sz="1600" b="1" dirty="0" err="1" smtClean="0">
-                <a:solidFill>
-                  <a:schemeClr val="accent2"/>
-                </a:solidFill>
-                <a:latin typeface="Trebuchet MS" charset="0"/>
-              </a:rPr>
-              <a:t>Wiley</a:t>
-            </a:r>
-            <a:r>
-              <a:rPr lang="es-ES_tradnl" sz="1600" b="1" dirty="0" smtClean="0">
-                <a:solidFill>
-                  <a:schemeClr val="accent2"/>
-                </a:solidFill>
-                <a:latin typeface="Trebuchet MS" charset="0"/>
-              </a:rPr>
-              <a:t>-</a:t>
-            </a:r>
-            <a:r>
-              <a:rPr lang="es-ES_tradnl" sz="1600" b="1" dirty="0" err="1" smtClean="0">
-                <a:solidFill>
-                  <a:schemeClr val="accent2"/>
-                </a:solidFill>
-                <a:latin typeface="Trebuchet MS" charset="0"/>
-              </a:rPr>
-              <a:t>Blackwell</a:t>
-            </a:r>
-            <a:r>
-              <a:rPr lang="es-ES_tradnl" sz="1600" b="1" dirty="0" smtClean="0">
-                <a:solidFill>
-                  <a:schemeClr val="accent2"/>
-                </a:solidFill>
-                <a:latin typeface="Trebuchet MS" charset="0"/>
-              </a:rPr>
-              <a:t>, 2011. </a:t>
-            </a:r>
-          </a:p>
-          <a:p>
-            <a:r>
-              <a:rPr lang="es-ES_tradnl" sz="1600" b="1" dirty="0" err="1" smtClean="0">
-                <a:solidFill>
-                  <a:schemeClr val="accent2"/>
-                </a:solidFill>
-                <a:latin typeface="Trebuchet MS" charset="0"/>
-              </a:rPr>
-              <a:t>•</a:t>
-            </a:r>
-            <a:r>
-              <a:rPr lang="es-ES_tradnl" sz="1600" b="1" dirty="0" smtClean="0">
-                <a:solidFill>
-                  <a:schemeClr val="accent2"/>
-                </a:solidFill>
-                <a:latin typeface="Trebuchet MS" charset="0"/>
-              </a:rPr>
-              <a:t> Artículos seleccionados de las revistas: IEEE </a:t>
-            </a:r>
-            <a:r>
-              <a:rPr lang="es-ES_tradnl" sz="1600" b="1" dirty="0" err="1" smtClean="0">
-                <a:solidFill>
-                  <a:schemeClr val="accent2"/>
-                </a:solidFill>
-                <a:latin typeface="Trebuchet MS" charset="0"/>
-              </a:rPr>
-              <a:t>Trans</a:t>
-            </a:r>
-            <a:r>
-              <a:rPr lang="es-ES_tradnl" sz="1600" b="1" dirty="0" smtClean="0">
-                <a:solidFill>
-                  <a:schemeClr val="accent2"/>
-                </a:solidFill>
-                <a:latin typeface="Trebuchet MS" charset="0"/>
-              </a:rPr>
-              <a:t>. </a:t>
-            </a:r>
-            <a:r>
-              <a:rPr lang="es-ES_tradnl" sz="1600" b="1" dirty="0" err="1" smtClean="0">
-                <a:solidFill>
-                  <a:schemeClr val="accent2"/>
-                </a:solidFill>
-                <a:latin typeface="Trebuchet MS" charset="0"/>
-              </a:rPr>
-              <a:t>Pattern</a:t>
-            </a:r>
-            <a:r>
-              <a:rPr lang="es-ES_tradnl" sz="1600" b="1" dirty="0" smtClean="0">
-                <a:solidFill>
-                  <a:schemeClr val="accent2"/>
-                </a:solidFill>
-                <a:latin typeface="Trebuchet MS" charset="0"/>
-              </a:rPr>
-              <a:t> </a:t>
-            </a:r>
-            <a:r>
-              <a:rPr lang="es-ES_tradnl" sz="1600" b="1" dirty="0" err="1" smtClean="0">
-                <a:solidFill>
-                  <a:schemeClr val="accent2"/>
-                </a:solidFill>
-                <a:latin typeface="Trebuchet MS" charset="0"/>
-              </a:rPr>
-              <a:t>Analysis</a:t>
-            </a:r>
-            <a:r>
-              <a:rPr lang="es-ES_tradnl" sz="1600" b="1" dirty="0" smtClean="0">
-                <a:solidFill>
-                  <a:schemeClr val="accent2"/>
-                </a:solidFill>
-                <a:latin typeface="Trebuchet MS" charset="0"/>
-              </a:rPr>
-              <a:t> </a:t>
-            </a:r>
-            <a:r>
-              <a:rPr lang="es-ES_tradnl" sz="1600" b="1" dirty="0" err="1" smtClean="0">
-                <a:solidFill>
-                  <a:schemeClr val="accent2"/>
-                </a:solidFill>
-                <a:latin typeface="Trebuchet MS" charset="0"/>
-              </a:rPr>
-              <a:t>and</a:t>
-            </a:r>
-            <a:r>
-              <a:rPr lang="es-ES_tradnl" sz="1600" b="1" dirty="0" smtClean="0">
-                <a:solidFill>
-                  <a:schemeClr val="accent2"/>
-                </a:solidFill>
-                <a:latin typeface="Trebuchet MS" charset="0"/>
-              </a:rPr>
-              <a:t> </a:t>
-            </a:r>
-            <a:r>
-              <a:rPr lang="es-ES_tradnl" sz="1600" b="1" dirty="0" err="1" smtClean="0">
-                <a:solidFill>
-                  <a:schemeClr val="accent2"/>
-                </a:solidFill>
-                <a:latin typeface="Trebuchet MS" charset="0"/>
-              </a:rPr>
-              <a:t>Machine</a:t>
-            </a:r>
-            <a:r>
-              <a:rPr lang="es-ES_tradnl" sz="1600" b="1" dirty="0" smtClean="0">
-                <a:solidFill>
-                  <a:schemeClr val="accent2"/>
-                </a:solidFill>
-                <a:latin typeface="Trebuchet MS" charset="0"/>
-              </a:rPr>
-              <a:t> </a:t>
-            </a:r>
-            <a:r>
-              <a:rPr lang="es-ES_tradnl" sz="1600" b="1" dirty="0" err="1" smtClean="0">
-                <a:solidFill>
-                  <a:schemeClr val="accent2"/>
-                </a:solidFill>
-                <a:latin typeface="Trebuchet MS" charset="0"/>
-              </a:rPr>
-              <a:t>Intelligence</a:t>
-            </a:r>
-            <a:r>
-              <a:rPr lang="es-ES_tradnl" sz="1600" b="1" dirty="0" smtClean="0">
-                <a:solidFill>
-                  <a:schemeClr val="accent2"/>
-                </a:solidFill>
-                <a:latin typeface="Trebuchet MS" charset="0"/>
-              </a:rPr>
-              <a:t>, IEEE </a:t>
-            </a:r>
-            <a:r>
-              <a:rPr lang="es-ES_tradnl" sz="1600" b="1" dirty="0" err="1" smtClean="0">
-                <a:solidFill>
-                  <a:schemeClr val="accent2"/>
-                </a:solidFill>
-                <a:latin typeface="Trebuchet MS" charset="0"/>
-              </a:rPr>
-              <a:t>Trans</a:t>
-            </a:r>
-            <a:r>
-              <a:rPr lang="es-ES_tradnl" sz="1600" b="1" dirty="0" smtClean="0">
-                <a:solidFill>
-                  <a:schemeClr val="accent2"/>
-                </a:solidFill>
-                <a:latin typeface="Trebuchet MS" charset="0"/>
-              </a:rPr>
-              <a:t>. </a:t>
-            </a:r>
-            <a:r>
-              <a:rPr lang="es-ES_tradnl" sz="1600" b="1" dirty="0" err="1" smtClean="0">
-                <a:solidFill>
-                  <a:schemeClr val="accent2"/>
-                </a:solidFill>
-                <a:latin typeface="Trebuchet MS" charset="0"/>
-              </a:rPr>
-              <a:t>on</a:t>
-            </a:r>
-            <a:r>
-              <a:rPr lang="es-ES_tradnl" sz="1600" b="1" dirty="0" smtClean="0">
-                <a:solidFill>
-                  <a:schemeClr val="accent2"/>
-                </a:solidFill>
-                <a:latin typeface="Trebuchet MS" charset="0"/>
-              </a:rPr>
-              <a:t> </a:t>
-            </a:r>
-            <a:r>
-              <a:rPr lang="es-ES_tradnl" sz="1600" b="1" dirty="0" err="1" smtClean="0">
-                <a:solidFill>
-                  <a:schemeClr val="accent2"/>
-                </a:solidFill>
-                <a:latin typeface="Trebuchet MS" charset="0"/>
-              </a:rPr>
-              <a:t>Image</a:t>
-            </a:r>
-            <a:r>
-              <a:rPr lang="es-ES_tradnl" sz="1600" b="1" dirty="0" smtClean="0">
-                <a:solidFill>
-                  <a:schemeClr val="accent2"/>
-                </a:solidFill>
-                <a:latin typeface="Trebuchet MS" charset="0"/>
-              </a:rPr>
-              <a:t> </a:t>
-            </a:r>
-            <a:r>
-              <a:rPr lang="es-ES_tradnl" sz="1600" b="1" dirty="0" err="1" smtClean="0">
-                <a:solidFill>
-                  <a:schemeClr val="accent2"/>
-                </a:solidFill>
-                <a:latin typeface="Trebuchet MS" charset="0"/>
-              </a:rPr>
-              <a:t>Processing</a:t>
-            </a:r>
-            <a:r>
-              <a:rPr lang="es-ES_tradnl" sz="1600" b="1" dirty="0" smtClean="0">
-                <a:solidFill>
-                  <a:schemeClr val="accent2"/>
-                </a:solidFill>
-                <a:latin typeface="Trebuchet MS" charset="0"/>
-              </a:rPr>
-              <a:t> así como de los </a:t>
-            </a:r>
-            <a:r>
-              <a:rPr lang="es-ES_tradnl" sz="1600" b="1" dirty="0" err="1" smtClean="0">
-                <a:solidFill>
-                  <a:schemeClr val="accent2"/>
-                </a:solidFill>
-                <a:latin typeface="Trebuchet MS" charset="0"/>
-              </a:rPr>
-              <a:t>Proceedings</a:t>
-            </a:r>
-            <a:r>
-              <a:rPr lang="es-ES_tradnl" sz="1600" b="1" dirty="0" smtClean="0">
-                <a:solidFill>
-                  <a:schemeClr val="accent2"/>
-                </a:solidFill>
-                <a:latin typeface="Trebuchet MS" charset="0"/>
-              </a:rPr>
-              <a:t> </a:t>
-            </a:r>
-            <a:r>
-              <a:rPr lang="es-ES_tradnl" sz="1600" b="1" dirty="0" err="1" smtClean="0">
-                <a:solidFill>
-                  <a:schemeClr val="accent2"/>
-                </a:solidFill>
-                <a:latin typeface="Trebuchet MS" charset="0"/>
-              </a:rPr>
-              <a:t>of</a:t>
-            </a:r>
-            <a:r>
-              <a:rPr lang="es-ES_tradnl" sz="1600" b="1" dirty="0" smtClean="0">
-                <a:solidFill>
-                  <a:schemeClr val="accent2"/>
-                </a:solidFill>
-                <a:latin typeface="Trebuchet MS" charset="0"/>
-              </a:rPr>
-              <a:t> International </a:t>
-            </a:r>
-            <a:r>
-              <a:rPr lang="es-ES_tradnl" sz="1600" b="1" dirty="0" err="1" smtClean="0">
-                <a:solidFill>
-                  <a:schemeClr val="accent2"/>
-                </a:solidFill>
-                <a:latin typeface="Trebuchet MS" charset="0"/>
-              </a:rPr>
-              <a:t>Conferences</a:t>
-            </a:r>
-            <a:r>
-              <a:rPr lang="es-ES_tradnl" sz="1600" b="1" dirty="0" smtClean="0">
-                <a:solidFill>
-                  <a:schemeClr val="accent2"/>
-                </a:solidFill>
-                <a:latin typeface="Trebuchet MS" charset="0"/>
-              </a:rPr>
-              <a:t> </a:t>
-            </a:r>
-            <a:r>
-              <a:rPr lang="es-ES_tradnl" sz="1600" b="1" dirty="0" err="1" smtClean="0">
-                <a:solidFill>
-                  <a:schemeClr val="accent2"/>
-                </a:solidFill>
-                <a:latin typeface="Trebuchet MS" charset="0"/>
-              </a:rPr>
-              <a:t>on</a:t>
-            </a:r>
-            <a:r>
-              <a:rPr lang="es-ES_tradnl" sz="1600" b="1" dirty="0" smtClean="0">
-                <a:solidFill>
-                  <a:schemeClr val="accent2"/>
-                </a:solidFill>
-                <a:latin typeface="Trebuchet MS" charset="0"/>
-              </a:rPr>
-              <a:t> </a:t>
-            </a:r>
-            <a:r>
-              <a:rPr lang="es-ES_tradnl" sz="1600" b="1" dirty="0" err="1" smtClean="0">
-                <a:solidFill>
-                  <a:schemeClr val="accent2"/>
-                </a:solidFill>
-                <a:latin typeface="Trebuchet MS" charset="0"/>
-              </a:rPr>
-              <a:t>Image</a:t>
-            </a:r>
-            <a:r>
-              <a:rPr lang="es-ES_tradnl" sz="1600" b="1" dirty="0" smtClean="0">
-                <a:solidFill>
-                  <a:schemeClr val="accent2"/>
-                </a:solidFill>
-                <a:latin typeface="Trebuchet MS" charset="0"/>
-              </a:rPr>
-              <a:t> </a:t>
-            </a:r>
-            <a:r>
-              <a:rPr lang="es-ES_tradnl" sz="1600" b="1" dirty="0" err="1" smtClean="0">
-                <a:solidFill>
-                  <a:schemeClr val="accent2"/>
-                </a:solidFill>
-                <a:latin typeface="Trebuchet MS" charset="0"/>
-              </a:rPr>
-              <a:t>Processing</a:t>
-            </a:r>
-            <a:r>
-              <a:rPr lang="es-ES_tradnl" sz="1600" b="1" dirty="0" smtClean="0">
-                <a:solidFill>
-                  <a:schemeClr val="accent2"/>
-                </a:solidFill>
-                <a:latin typeface="Trebuchet MS" charset="0"/>
-              </a:rPr>
-              <a:t>, </a:t>
-            </a:r>
-            <a:r>
-              <a:rPr lang="es-ES_tradnl" sz="1600" b="1" dirty="0" err="1" smtClean="0">
-                <a:solidFill>
-                  <a:schemeClr val="accent2"/>
-                </a:solidFill>
-                <a:latin typeface="Trebuchet MS" charset="0"/>
-              </a:rPr>
-              <a:t>Computer</a:t>
-            </a:r>
-            <a:r>
-              <a:rPr lang="es-ES_tradnl" sz="1600" b="1" dirty="0" smtClean="0">
-                <a:solidFill>
-                  <a:schemeClr val="accent2"/>
-                </a:solidFill>
-                <a:latin typeface="Trebuchet MS" charset="0"/>
-              </a:rPr>
-              <a:t> </a:t>
-            </a:r>
-            <a:r>
-              <a:rPr lang="es-ES_tradnl" sz="1600" b="1" dirty="0" err="1" smtClean="0">
-                <a:solidFill>
-                  <a:schemeClr val="accent2"/>
-                </a:solidFill>
-                <a:latin typeface="Trebuchet MS" charset="0"/>
-              </a:rPr>
-              <a:t>Vision</a:t>
-            </a:r>
-            <a:r>
-              <a:rPr lang="es-ES_tradnl" sz="1600" b="1" dirty="0" smtClean="0">
-                <a:solidFill>
-                  <a:schemeClr val="accent2"/>
-                </a:solidFill>
-                <a:latin typeface="Trebuchet MS" charset="0"/>
-              </a:rPr>
-              <a:t> </a:t>
-            </a:r>
-            <a:r>
-              <a:rPr lang="es-ES_tradnl" sz="1600" b="1" dirty="0" err="1" smtClean="0">
-                <a:solidFill>
-                  <a:schemeClr val="accent2"/>
-                </a:solidFill>
-                <a:latin typeface="Trebuchet MS" charset="0"/>
-              </a:rPr>
-              <a:t>and</a:t>
-            </a:r>
-            <a:r>
-              <a:rPr lang="es-ES_tradnl" sz="1600" b="1" dirty="0" smtClean="0">
-                <a:solidFill>
-                  <a:schemeClr val="accent2"/>
-                </a:solidFill>
-                <a:latin typeface="Trebuchet MS" charset="0"/>
-              </a:rPr>
-              <a:t> </a:t>
-            </a:r>
-            <a:r>
-              <a:rPr lang="es-ES_tradnl" sz="1600" b="1" dirty="0" err="1" smtClean="0">
-                <a:solidFill>
-                  <a:schemeClr val="accent2"/>
-                </a:solidFill>
-                <a:latin typeface="Trebuchet MS" charset="0"/>
-              </a:rPr>
-              <a:t>Pattern</a:t>
-            </a:r>
-            <a:r>
-              <a:rPr lang="es-ES_tradnl" sz="1600" b="1" dirty="0" smtClean="0">
-                <a:solidFill>
-                  <a:schemeClr val="accent2"/>
-                </a:solidFill>
-                <a:latin typeface="Trebuchet MS" charset="0"/>
-              </a:rPr>
-              <a:t> </a:t>
-            </a:r>
-            <a:r>
-              <a:rPr lang="es-ES_tradnl" sz="1600" b="1" dirty="0" err="1" smtClean="0">
+              <a:rPr lang="es-ES_tradnl" sz="1600" b="1" dirty="0" err="1">
                 <a:solidFill>
                   <a:schemeClr val="accent2"/>
                 </a:solidFill>
@@ -12781,7 +12365,7 @@
               <a:t>Recognition</a:t>
             </a:r>
             <a:r>
-              <a:rPr lang="es-ES_tradnl" sz="1600" b="1" dirty="0" smtClean="0">
+              <a:rPr lang="es-ES_tradnl" sz="1600" b="1" dirty="0">
                 <a:solidFill>
                   <a:schemeClr val="accent2"/>
                 </a:solidFill>
@@ -12805,13 +12389,6 @@
   <p:clrMapOvr>
     <a:masterClrMapping/>
   </p:clrMapOvr>
-  <p:timing>
-    <p:tnLst>
-      <p:par>
-        <p:cTn id="1" dur="indefinite" restart="never" nodeType="tmRoot"/>
-      </p:par>
-    </p:tnLst>
-  </p:timing>
 </p:sld>
 </file>
 
@@ -12856,38 +12433,13 @@
           <a:p>
             <a:pPr algn="just"/>
             <a:r>
-              <a:rPr lang="es-ES" sz="2400" b="1" dirty="0" smtClean="0">
+              <a:rPr lang="es-ES" sz="2400" b="1" dirty="0">
                 <a:solidFill>
                   <a:schemeClr val="accent2"/>
                 </a:solidFill>
                 <a:latin typeface="Trebuchet MS" charset="0"/>
               </a:rPr>
               <a:t>Compromiso del Código de Honor de la Escuela de Ingeniería</a:t>
-            </a:r>
-            <a:endParaRPr lang="es-ES" sz="2400" b="1" dirty="0">
-              <a:solidFill>
-                <a:schemeClr val="accent2"/>
-              </a:solidFill>
-              <a:latin typeface="Trebuchet MS" charset="0"/>
-            </a:endParaRPr>
-          </a:p>
-          <a:p>
-            <a:pPr algn="just"/>
-            <a:endParaRPr lang="es-ES" dirty="0" smtClean="0"/>
-          </a:p>
-          <a:p>
-            <a:pPr algn="just"/>
-            <a:r>
-              <a:rPr lang="es-ES" dirty="0" smtClean="0"/>
-              <a:t>Este </a:t>
-            </a:r>
-            <a:r>
-              <a:rPr lang="es-ES" dirty="0"/>
-              <a:t>curso adscribe el Código de Honor establecido por la Escuela de Ingeniería el que es vinculante. Todo trabajo evaluado en este curso debe ser propio. En caso de que exista colaboración permitida con otros estudiantes, el trabajo deberá referenciar y atribuir correctamente dicha contribución a quien corresponda. Como estudiante es su deber conocer la versión en línea del Código de </a:t>
-            </a:r>
-            <a:r>
-              <a:rPr lang="es-ES" dirty="0" smtClean="0"/>
-              <a:t>Honor.</a:t>
             </a:r>
           </a:p>
           <a:p>
@@ -12897,19 +12449,24 @@
           <a:p>
             <a:pPr algn="just"/>
             <a:r>
+              <a:rPr lang="es-ES" dirty="0"/>
+              <a:t>Este curso adscribe el Código de Honor establecido por la Escuela de Ingeniería el que es vinculante. Todo trabajo evaluado en este curso debe ser propio. En caso de que exista colaboración permitida con otros estudiantes, el trabajo deberá referenciar y atribuir correctamente dicha contribución a quien corresponda. Como estudiante es su deber conocer la versión en línea del Código de Honor.</a:t>
+            </a:r>
+          </a:p>
+          <a:p>
+            <a:pPr algn="just"/>
+            <a:endParaRPr lang="es-ES" dirty="0"/>
+          </a:p>
+          <a:p>
+            <a:pPr algn="just"/>
+            <a:r>
               <a:rPr lang="es-ES" dirty="0">
                 <a:hlinkClick r:id="rId2"/>
               </a:rPr>
-              <a:t>www.ing.puc.cl/nuestra-escuela/ingenieria-uc/codigo-de-honor</a:t>
-            </a:r>
-            <a:r>
-              <a:rPr lang="es-ES" dirty="0" smtClean="0">
-                <a:hlinkClick r:id="rId2"/>
-              </a:rPr>
-              <a:t>/</a:t>
-            </a:r>
-            <a:r>
-              <a:rPr lang="es-ES" dirty="0" smtClean="0"/>
+              <a:t>www.ing.puc.cl/nuestra-escuela/ingenieria-uc/codigo-de-honor/</a:t>
+            </a:r>
+            <a:r>
+              <a:rPr lang="es-ES" dirty="0"/>
               <a:t> </a:t>
             </a:r>
           </a:p>
@@ -12929,13 +12486,6 @@
   <p:clrMapOvr>
     <a:masterClrMapping/>
   </p:clrMapOvr>
-  <p:timing>
-    <p:tnLst>
-      <p:par>
-        <p:cTn id="1" dur="indefinite" restart="never" nodeType="tmRoot"/>
-      </p:par>
-    </p:tnLst>
-  </p:timing>
 </p:sld>
 </file>
 
@@ -13028,32 +12578,20 @@
               <a:rPr lang="es-CL" sz="1500" dirty="0">
                 <a:latin typeface="Trebuchet MS" charset="0"/>
               </a:rPr>
-              <a:t>Es responsabilidad de cada alumno conocer y respetar el documento sobre Integridad Académica publicado por la Dirección de Docencia de la Escuela de </a:t>
-            </a:r>
-            <a:r>
-              <a:rPr lang="es-CL" sz="1500" dirty="0" smtClean="0">
-                <a:latin typeface="Trebuchet MS" charset="0"/>
-              </a:rPr>
-              <a:t>Ingeniería.</a:t>
-            </a:r>
-          </a:p>
-          <a:p>
-            <a:endParaRPr lang="es-CL" sz="1500" dirty="0" smtClean="0">
+              <a:t>Es responsabilidad de cada alumno conocer y respetar el documento sobre Integridad Académica publicado por la Dirección de Docencia de la Escuela de Ingeniería.</a:t>
+            </a:r>
+          </a:p>
+          <a:p>
+            <a:endParaRPr lang="es-CL" sz="1500" dirty="0">
               <a:latin typeface="Trebuchet MS" charset="0"/>
             </a:endParaRPr>
           </a:p>
           <a:p>
             <a:r>
-              <a:rPr lang="es-CL" sz="1500" dirty="0" smtClean="0">
-                <a:latin typeface="Trebuchet MS" charset="0"/>
-              </a:rPr>
-              <a:t>Específicamente</a:t>
-            </a:r>
-            <a:r>
               <a:rPr lang="es-CL" sz="1500" dirty="0">
                 <a:latin typeface="Trebuchet MS" charset="0"/>
               </a:rPr>
-              <a:t>, para los cursos del Departamento de Ciencia de la Computación, rige obligatoriamente la siguiente política de integridad académica. Todo trabajo presentado por un alumno para los efectos de la evaluación de un curso debe ser hecho individualmente por el alumno, sin apoyo en material de terceros. Por “trabajo” se entiende en general las interrogaciones escritas, las tareas de programación u otras, los trabajos de laboratorio, los proyectos, el examen, entre otros.</a:t>
+              <a:t>Específicamente, para los cursos del Departamento de Ciencia de la Computación, rige obligatoriamente la siguiente política de integridad académica. Todo trabajo presentado por un alumno para los efectos de la evaluación de un curso debe ser hecho individualmente por el alumno, sin apoyo en material de terceros. Por “trabajo” se entiende en general las interrogaciones escritas, las tareas de programación u otras, los trabajos de laboratorio, los proyectos, el examen, entre otros.</a:t>
             </a:r>
             <a:endParaRPr lang="es-ES" sz="1500" b="1" dirty="0">
               <a:solidFill>
@@ -13069,13 +12607,6 @@
   <p:clrMapOvr>
     <a:masterClrMapping/>
   </p:clrMapOvr>
-  <p:timing>
-    <p:tnLst>
-      <p:par>
-        <p:cTn id="1" dur="indefinite" restart="never" nodeType="tmRoot"/>
-      </p:par>
-    </p:tnLst>
-  </p:timing>
 </p:sld>
 </file>
 
@@ -13192,44 +12723,23 @@
               <a:rPr lang="es-CL" sz="1500" dirty="0">
                 <a:latin typeface="Trebuchet MS" charset="0"/>
               </a:rPr>
-              <a:t>Obviamente, está permitido usar material disponible públicamente, por ejemplo, libros o contenidos tomados de Internet, siempre y cuando se incluya la referencia correspondiente. Lo anterior se entiende como complemento al Reglamento del Alumno de la Pontificia Universidad Católica de </a:t>
-            </a:r>
-            <a:r>
-              <a:rPr lang="es-CL" sz="1500" dirty="0" smtClean="0">
-                <a:latin typeface="Trebuchet MS" charset="0"/>
-              </a:rPr>
-              <a:t>Chile.</a:t>
-            </a:r>
-          </a:p>
-          <a:p>
-            <a:endParaRPr lang="es-CL" sz="1500" dirty="0" smtClean="0">
+              <a:t>Obviamente, está permitido usar material disponible públicamente, por ejemplo, libros o contenidos tomados de Internet, siempre y cuando se incluya la referencia correspondiente. Lo anterior se entiende como complemento al Reglamento del Alumno de la Pontificia Universidad Católica de Chile.</a:t>
+            </a:r>
+          </a:p>
+          <a:p>
+            <a:endParaRPr lang="es-CL" sz="1500" dirty="0">
               <a:latin typeface="Trebuchet MS" charset="0"/>
             </a:endParaRPr>
           </a:p>
           <a:p>
             <a:r>
-              <a:rPr lang="es-CL" sz="1500" dirty="0" smtClean="0">
-                <a:latin typeface="Trebuchet MS" charset="0"/>
-              </a:rPr>
-              <a:t>Por </a:t>
-            </a:r>
-            <a:r>
               <a:rPr lang="es-CL" sz="1500" dirty="0">
                 <a:latin typeface="Trebuchet MS" charset="0"/>
               </a:rPr>
-              <a:t>ello, es posible pedir a la Universidad la aplicación de sanciones adicionales especificadas en dicho reglamento.</a:t>
-            </a:r>
-          </a:p>
-          <a:p>
-            <a:r>
-              <a:rPr lang="es-ES" sz="1600" b="1" dirty="0">
-                <a:solidFill>
-                  <a:schemeClr val="accent2"/>
-                </a:solidFill>
-                <a:latin typeface="Trebuchet MS" charset="0"/>
-              </a:rPr>
-              <a:t/>
-            </a:r>
+              <a:t>Por ello, es posible pedir a la Universidad la aplicación de sanciones adicionales especificadas en dicho reglamento.</a:t>
+            </a:r>
+          </a:p>
+          <a:p>
             <a:br>
               <a:rPr lang="es-ES" sz="1600" b="1" dirty="0">
                 <a:solidFill>
@@ -13252,13 +12762,6 @@
   <p:clrMapOvr>
     <a:masterClrMapping/>
   </p:clrMapOvr>
-  <p:timing>
-    <p:tnLst>
-      <p:par>
-        <p:cTn id="1" dur="indefinite" restart="never" nodeType="tmRoot"/>
-      </p:par>
-    </p:tnLst>
-  </p:timing>
 </p:sld>
 </file>
 
@@ -13397,35 +12900,10 @@
                 </a:solidFill>
                 <a:latin typeface="Trebuchet MS" charset="0"/>
               </a:rPr>
-              <a:t> &gt;</a:t>
-            </a:r>
-            <a:r>
-              <a:rPr lang="es-CL" b="1" dirty="0" smtClean="0">
-                <a:solidFill>
-                  <a:schemeClr val="accent2"/>
-                </a:solidFill>
-                <a:latin typeface="Trebuchet MS" charset="0"/>
-              </a:rPr>
-              <a:t> Teaching </a:t>
-            </a:r>
-            <a:r>
-              <a:rPr lang="es-CL" b="1" dirty="0">
-                <a:solidFill>
-                  <a:schemeClr val="accent2"/>
-                </a:solidFill>
-                <a:latin typeface="Trebuchet MS" charset="0"/>
-              </a:rPr>
-              <a:t>&gt;</a:t>
-            </a:r>
-            <a:r>
-              <a:rPr lang="es-CL" b="1" dirty="0" smtClean="0">
-                <a:solidFill>
-                  <a:schemeClr val="accent2"/>
-                </a:solidFill>
-                <a:latin typeface="Trebuchet MS" charset="0"/>
-              </a:rPr>
-              <a:t> Procesamiento de Imágenes</a:t>
-            </a:r>
+              <a:t> &gt; Teaching &gt; Procesamiento de Imágenes</a:t>
+            </a:r>
+          </a:p>
+          <a:p>
             <a:endParaRPr lang="es-CL" b="1" dirty="0">
               <a:solidFill>
                 <a:schemeClr val="accent2"/>
@@ -13434,6 +12912,26 @@
             </a:endParaRPr>
           </a:p>
           <a:p>
+            <a:r>
+              <a:rPr lang="es-CL" b="1">
+                <a:solidFill>
+                  <a:schemeClr val="accent2"/>
+                </a:solidFill>
+                <a:latin typeface="Trebuchet MS" charset="0"/>
+                <a:hlinkClick r:id="rId4"/>
+              </a:rPr>
+              <a:t>Domingo.mery@uc</a:t>
+            </a:r>
+            <a:r>
+              <a:rPr lang="es-CL" b="1" dirty="0">
+                <a:solidFill>
+                  <a:schemeClr val="accent2"/>
+                </a:solidFill>
+                <a:latin typeface="Trebuchet MS" charset="0"/>
+                <a:hlinkClick r:id="rId4"/>
+              </a:rPr>
+              <a:t>.cl</a:t>
+            </a:r>
             <a:endParaRPr lang="es-CL" b="1" dirty="0">
               <a:solidFill>
                 <a:schemeClr val="accent2"/>
@@ -13442,16 +12940,6 @@
             </a:endParaRPr>
           </a:p>
           <a:p>
-            <a:r>
-              <a:rPr lang="es-CL" b="1" dirty="0">
-                <a:solidFill>
-                  <a:schemeClr val="accent2"/>
-                </a:solidFill>
-                <a:latin typeface="Trebuchet MS" charset="0"/>
-                <a:hlinkClick r:id="rId4"/>
-              </a:rPr>
-              <a:t>dmery@ing.puc.cl</a:t>
-            </a:r>
             <a:endParaRPr lang="es-CL" b="1" dirty="0">
               <a:solidFill>
                 <a:schemeClr val="accent2"/>
@@ -13460,6 +12948,17 @@
             </a:endParaRPr>
           </a:p>
           <a:p>
+            <a:r>
+              <a:rPr lang="es-CL" b="1" dirty="0">
+                <a:solidFill>
+                  <a:schemeClr val="accent2"/>
+                </a:solidFill>
+                <a:latin typeface="Trebuchet MS" charset="0"/>
+              </a:rPr>
+              <a:t>Tel. 354-5808</a:t>
+            </a:r>
+          </a:p>
+          <a:p>
             <a:endParaRPr lang="es-CL" b="1" dirty="0">
               <a:solidFill>
                 <a:schemeClr val="accent2"/>
@@ -13475,25 +12974,6 @@
                 </a:solidFill>
                 <a:latin typeface="Trebuchet MS" charset="0"/>
               </a:rPr>
-              <a:t>Tel. 354-5808</a:t>
-            </a:r>
-          </a:p>
-          <a:p>
-            <a:endParaRPr lang="es-CL" b="1" dirty="0">
-              <a:solidFill>
-                <a:schemeClr val="accent2"/>
-              </a:solidFill>
-              <a:latin typeface="Trebuchet MS" charset="0"/>
-            </a:endParaRPr>
-          </a:p>
-          <a:p>
-            <a:r>
-              <a:rPr lang="es-CL" b="1" dirty="0">
-                <a:solidFill>
-                  <a:schemeClr val="accent2"/>
-                </a:solidFill>
-                <a:latin typeface="Trebuchet MS" charset="0"/>
-              </a:rPr>
               <a:t>Oficina 20, Edificio San Agustín</a:t>
             </a:r>
             <a:endParaRPr lang="es-ES" b="1" dirty="0">
@@ -13510,13 +12990,6 @@
   <p:clrMapOvr>
     <a:masterClrMapping/>
   </p:clrMapOvr>
-  <p:timing>
-    <p:tnLst>
-      <p:par>
-        <p:cTn id="1" dur="indefinite" restart="never" nodeType="tmRoot"/>
-      </p:par>
-    </p:tnLst>
-  </p:timing>
 </p:sld>
 </file>
 
@@ -14076,13 +13549,6 @@
   <p:clrMapOvr>
     <a:masterClrMapping/>
   </p:clrMapOvr>
-  <p:timing>
-    <p:tnLst>
-      <p:par>
-        <p:cTn id="1" dur="indefinite" restart="never" nodeType="tmRoot"/>
-      </p:par>
-    </p:tnLst>
-  </p:timing>
 </p:sld>
 </file>
 
@@ -14177,14 +13643,14 @@
           </a:bodyPr>
           <a:lstStyle/>
           <a:p>
-            <a:endParaRPr lang="es-ES_tradnl" sz="1700" b="1" dirty="0" smtClean="0">
+            <a:endParaRPr lang="es-ES_tradnl" sz="1700" b="1" dirty="0">
               <a:latin typeface="Bookman Old Style"/>
               <a:cs typeface="Bookman Old Style"/>
             </a:endParaRPr>
           </a:p>
           <a:p>
             <a:r>
-              <a:rPr lang="es-ES_tradnl" sz="1700" b="1" dirty="0" smtClean="0">
+              <a:rPr lang="es-ES_tradnl" sz="1700" b="1" dirty="0">
                 <a:latin typeface="Bookman Old Style"/>
                 <a:cs typeface="Bookman Old Style"/>
               </a:rPr>
@@ -14192,7 +13658,7 @@
             </a:r>
           </a:p>
           <a:p>
-            <a:endParaRPr lang="es-ES_tradnl" sz="800" b="1" dirty="0" smtClean="0">
+            <a:endParaRPr lang="es-ES_tradnl" sz="800" b="1" dirty="0">
               <a:latin typeface="Bookman Old Style"/>
               <a:cs typeface="Bookman Old Style"/>
             </a:endParaRPr>
@@ -14222,16 +13688,12 @@
           <a:lstStyle/>
           <a:p>
             <a:r>
-              <a:rPr lang="es-ES_tradnl" b="1" dirty="0" smtClean="0">
+              <a:rPr lang="es-ES_tradnl" b="1" dirty="0">
                 <a:latin typeface="Bookman Old Style"/>
                 <a:cs typeface="Bookman Old Style"/>
               </a:rPr>
               <a:t>CURSOS</a:t>
             </a:r>
-            <a:endParaRPr lang="es-ES_tradnl" b="1" dirty="0">
-              <a:latin typeface="Bookman Old Style"/>
-              <a:cs typeface="Bookman Old Style"/>
-            </a:endParaRPr>
           </a:p>
         </p:txBody>
       </p:sp>
@@ -14240,13 +13702,6 @@
   <p:clrMapOvr>
     <a:masterClrMapping/>
   </p:clrMapOvr>
-  <p:timing>
-    <p:tnLst>
-      <p:par>
-        <p:cTn id="1" dur="indefinite" restart="never" nodeType="tmRoot"/>
-      </p:par>
-    </p:tnLst>
-  </p:timing>
 </p:sld>
 </file>
 
@@ -14350,13 +13805,6 @@
   <p:clrMapOvr>
     <a:masterClrMapping/>
   </p:clrMapOvr>
-  <p:timing>
-    <p:tnLst>
-      <p:par>
-        <p:cTn id="1" dur="indefinite" restart="never" nodeType="tmRoot"/>
-      </p:par>
-    </p:tnLst>
-  </p:timing>
 </p:sld>
 </file>
 
@@ -14438,7 +13886,7 @@
           <a:lstStyle/>
           <a:p>
             <a:r>
-              <a:rPr lang="en-US" sz="800" dirty="0" smtClean="0">
+              <a:rPr lang="en-US" sz="800" dirty="0">
                 <a:solidFill>
                   <a:schemeClr val="bg1">
                     <a:lumMod val="65000"/>
@@ -14448,7 +13896,7 @@
               <a:t>D. Mery: The woman in green, Kyoto, 2009, D. Mery (</a:t>
             </a:r>
             <a:r>
-              <a:rPr lang="en-US" sz="800" dirty="0" err="1" smtClean="0">
+              <a:rPr lang="en-US" sz="800" dirty="0" err="1">
                 <a:solidFill>
                   <a:schemeClr val="bg1">
                     <a:lumMod val="65000"/>
@@ -14458,7 +13906,7 @@
               <a:t>ver</a:t>
             </a:r>
             <a:r>
-              <a:rPr lang="en-US" sz="800" dirty="0" smtClean="0">
+              <a:rPr lang="en-US" sz="800" dirty="0">
                 <a:solidFill>
                   <a:schemeClr val="bg1">
                     <a:lumMod val="65000"/>
@@ -14468,7 +13916,7 @@
               <a:t> </a:t>
             </a:r>
             <a:r>
-              <a:rPr lang="en-US" sz="800" dirty="0" smtClean="0">
+              <a:rPr lang="en-US" sz="800" dirty="0">
                 <a:solidFill>
                   <a:schemeClr val="bg1">
                     <a:lumMod val="65000"/>
@@ -14479,7 +13927,7 @@
               <a:t>HD</a:t>
             </a:r>
             <a:r>
-              <a:rPr lang="en-US" sz="800" dirty="0" smtClean="0">
+              <a:rPr lang="en-US" sz="800" dirty="0">
                 <a:solidFill>
                   <a:schemeClr val="bg1">
                     <a:lumMod val="65000"/>
@@ -14488,13 +13936,6 @@
               </a:rPr>
               <a:t>) </a:t>
             </a:r>
-            <a:endParaRPr lang="en-US" sz="800" dirty="0">
-              <a:solidFill>
-                <a:schemeClr val="bg1">
-                  <a:lumMod val="65000"/>
-                </a:schemeClr>
-              </a:solidFill>
-            </a:endParaRPr>
           </a:p>
         </p:txBody>
       </p:sp>
@@ -14508,13 +13949,6 @@
   <p:clrMapOvr>
     <a:masterClrMapping/>
   </p:clrMapOvr>
-  <p:timing>
-    <p:tnLst>
-      <p:par>
-        <p:cTn id="1" dur="indefinite" restart="never" nodeType="tmRoot"/>
-      </p:par>
-    </p:tnLst>
-  </p:timing>
 </p:sld>
 </file>
 
@@ -14733,13 +14167,6 @@
   <p:clrMapOvr>
     <a:masterClrMapping/>
   </p:clrMapOvr>
-  <p:timing>
-    <p:tnLst>
-      <p:par>
-        <p:cTn id="1" dur="indefinite" restart="never" nodeType="tmRoot"/>
-      </p:par>
-    </p:tnLst>
-  </p:timing>
 </p:sld>
 </file>
 
@@ -14802,15 +14229,6 @@
               </a:rPr>
               <a:t>Objetivo General</a:t>
             </a:r>
-            <a:r>
-              <a:rPr lang="es-ES">
-                <a:solidFill>
-                  <a:schemeClr val="accent2"/>
-                </a:solidFill>
-                <a:latin typeface="Trebuchet MS" charset="0"/>
-              </a:rPr>
-              <a:t/>
-            </a:r>
             <a:br>
               <a:rPr lang="es-ES">
                 <a:solidFill>
@@ -14895,13 +14313,6 @@
   <p:clrMapOvr>
     <a:masterClrMapping/>
   </p:clrMapOvr>
-  <p:timing>
-    <p:tnLst>
-      <p:par>
-        <p:cTn id="1" dur="indefinite" restart="never" nodeType="tmRoot"/>
-      </p:par>
-    </p:tnLst>
-  </p:timing>
 </p:sld>
 </file>
 

</xml_diff>